<commit_message>
Ryan's edits to presentation
</commit_message>
<xml_diff>
--- a/Presentation.pptx
+++ b/Presentation.pptx
@@ -131,7 +131,243 @@
       </a:defRPr>
     </a:lvl9pPr>
   </p:defaultTextStyle>
+  <p:extLst>
+    <p:ext uri="{EFAFB233-063F-42B5-8137-9DF3F51BA10A}">
+      <p15:sldGuideLst xmlns:p15="http://schemas.microsoft.com/office/powerpoint/2012/main"/>
+    </p:ext>
+  </p:extLst>
 </p:presentation>
+</file>
+
+<file path=ppt/authors.xml><?xml version="1.0" encoding="utf-8"?>
+<p188:authorLst xmlns:a="http://schemas.openxmlformats.org/drawingml/2006/main" xmlns:r="http://schemas.openxmlformats.org/officeDocument/2006/relationships" xmlns:p188="http://schemas.microsoft.com/office/powerpoint/2018/8/main">
+  <p188:author id="{DE9CABDE-A937-59CB-0A64-97A3DF0832AF}" name="Ryan Moreno" initials="RM" userId="S::ryan.moreno@mmnts.com::2bfa05a1-7039-4574-be6e-d335abdf9dd1" providerId="AD"/>
+</p188:authorLst>
+</file>
+
+<file path=ppt/comments/modernComment_104_E28082F3.xml><?xml version="1.0" encoding="utf-8"?>
+<p188:cmLst xmlns:a="http://schemas.openxmlformats.org/drawingml/2006/main" xmlns:r="http://schemas.openxmlformats.org/officeDocument/2006/relationships" xmlns:p188="http://schemas.microsoft.com/office/powerpoint/2018/8/main">
+  <p188:cm id="{E585BCC7-FA7E-9342-A8D6-071380EAD3ED}" authorId="{DE9CABDE-A937-59CB-0A64-97A3DF0832AF}" created="2024-12-08T05:33:23.054">
+    <ac:deMkLst xmlns:ac="http://schemas.microsoft.com/office/drawing/2013/main/command">
+      <pc:docMk xmlns:pc="http://schemas.microsoft.com/office/powerpoint/2013/main/command"/>
+      <pc:sldMk xmlns:pc="http://schemas.microsoft.com/office/powerpoint/2013/main/command" cId="3800072947" sldId="260"/>
+      <ac:picMk id="11" creationId="{80D298F1-E6F9-B91F-D237-997C58D2672D}"/>
+    </ac:deMkLst>
+    <p188:replyLst>
+      <p188:reply id="{295D2257-DB52-D140-B5E0-CA009BBB2BC6}" authorId="{DE9CABDE-A937-59CB-0A64-97A3DF0832AF}" created="2024-12-08T05:47:33.525">
+        <p188:txBody>
+          <a:bodyPr/>
+          <a:lstStyle/>
+          <a:p>
+            <a:r>
+              <a:rPr lang="en-US"/>
+              <a:t>We can label the y axis as Pearson Correlation Coefficient</a:t>
+            </a:r>
+          </a:p>
+        </p188:txBody>
+      </p188:reply>
+    </p188:replyLst>
+    <p188:txBody>
+      <a:bodyPr/>
+      <a:lstStyle/>
+      <a:p>
+        <a:r>
+          <a:rPr lang="en-US"/>
+          <a:t>Can we regenerate this plot with darker colors? This is pretty hard to see. And make the text for the axes bigger</a:t>
+        </a:r>
+      </a:p>
+    </p188:txBody>
+  </p188:cm>
+</p188:cmLst>
+</file>
+
+<file path=ppt/comments/modernComment_107_3C79689.xml><?xml version="1.0" encoding="utf-8"?>
+<p188:cmLst xmlns:a="http://schemas.openxmlformats.org/drawingml/2006/main" xmlns:r="http://schemas.openxmlformats.org/officeDocument/2006/relationships" xmlns:p188="http://schemas.microsoft.com/office/powerpoint/2018/8/main">
+  <p188:cm id="{55F2C4DD-F09E-8E47-98EF-837AD0C0F0FF}" authorId="{DE9CABDE-A937-59CB-0A64-97A3DF0832AF}" created="2024-12-08T05:59:00.734">
+    <pc:sldMkLst xmlns:pc="http://schemas.microsoft.com/office/powerpoint/2013/main/command">
+      <pc:docMk/>
+      <pc:sldMk cId="63411849" sldId="263"/>
+    </pc:sldMkLst>
+    <p188:txBody>
+      <a:bodyPr/>
+      <a:lstStyle/>
+      <a:p>
+        <a:r>
+          <a:rPr lang="en-US"/>
+          <a:t>I think it could be good to include an example of a plot with “bad” color choice in the motivation
+</a:t>
+        </a:r>
+      </a:p>
+    </p188:txBody>
+  </p188:cm>
+</p188:cmLst>
+</file>
+
+<file path=ppt/comments/modernComment_10D_79FB135.xml><?xml version="1.0" encoding="utf-8"?>
+<p188:cmLst xmlns:a="http://schemas.openxmlformats.org/drawingml/2006/main" xmlns:r="http://schemas.openxmlformats.org/officeDocument/2006/relationships" xmlns:p188="http://schemas.microsoft.com/office/powerpoint/2018/8/main">
+  <p188:cm id="{ABA9BFBE-EBDE-FE45-A636-DEAB4D9A6C37}" authorId="{DE9CABDE-A937-59CB-0A64-97A3DF0832AF}" created="2024-12-08T05:52:23.547">
+    <pc:sldMkLst xmlns:pc="http://schemas.microsoft.com/office/powerpoint/2013/main/command">
+      <pc:docMk/>
+      <pc:sldMk cId="127906101" sldId="269"/>
+    </pc:sldMkLst>
+    <p188:txBody>
+      <a:bodyPr/>
+      <a:lstStyle/>
+      <a:p>
+        <a:r>
+          <a:rPr lang="en-US"/>
+          <a:t>For a presentation, the in-slide references we already have should be good</a:t>
+        </a:r>
+      </a:p>
+    </p188:txBody>
+  </p188:cm>
+</p188:cmLst>
+</file>
+
+<file path=ppt/comments/modernComment_113_FABAC13A.xml><?xml version="1.0" encoding="utf-8"?>
+<p188:cmLst xmlns:a="http://schemas.openxmlformats.org/drawingml/2006/main" xmlns:r="http://schemas.openxmlformats.org/officeDocument/2006/relationships" xmlns:p188="http://schemas.microsoft.com/office/powerpoint/2018/8/main">
+  <p188:cm id="{FA11D25E-8404-7646-9F1D-668D8E84C553}" authorId="{DE9CABDE-A937-59CB-0A64-97A3DF0832AF}" created="2024-12-08T05:53:37.237">
+    <pc:sldMkLst xmlns:pc="http://schemas.microsoft.com/office/powerpoint/2013/main/command">
+      <pc:docMk/>
+      <pc:sldMk cId="4206543162" sldId="275"/>
+    </pc:sldMkLst>
+    <p188:txBody>
+      <a:bodyPr/>
+      <a:lstStyle/>
+      <a:p>
+        <a:r>
+          <a:rPr lang="en-US"/>
+          <a:t>Let’s make a diagram for this method as well</a:t>
+        </a:r>
+      </a:p>
+    </p188:txBody>
+  </p188:cm>
+</p188:cmLst>
+</file>
+
+<file path=ppt/comments/modernComment_115_A9BE0BB1.xml><?xml version="1.0" encoding="utf-8"?>
+<p188:cmLst xmlns:a="http://schemas.openxmlformats.org/drawingml/2006/main" xmlns:r="http://schemas.openxmlformats.org/officeDocument/2006/relationships" xmlns:p188="http://schemas.microsoft.com/office/powerpoint/2018/8/main">
+  <p188:cm id="{01F4138D-3FD8-464C-80A0-168406658293}" authorId="{DE9CABDE-A937-59CB-0A64-97A3DF0832AF}" created="2024-12-08T05:50:38.671">
+    <ac:deMkLst xmlns:ac="http://schemas.microsoft.com/office/drawing/2013/main/command">
+      <pc:docMk xmlns:pc="http://schemas.microsoft.com/office/powerpoint/2013/main/command"/>
+      <pc:sldMk xmlns:pc="http://schemas.microsoft.com/office/powerpoint/2013/main/command" cId="2847804337" sldId="277"/>
+      <ac:picMk id="6" creationId="{DA716C37-B359-92B3-1D6E-7B3B136FBA8B}"/>
+    </ac:deMkLst>
+    <p188:txBody>
+      <a:bodyPr/>
+      <a:lstStyle/>
+      <a:p>
+        <a:r>
+          <a:rPr lang="en-US"/>
+          <a:t>I think the way this is usually shown, we should bold (or highlight as done here) the top score for each row.</a:t>
+        </a:r>
+      </a:p>
+    </p188:txBody>
+  </p188:cm>
+</p188:cmLst>
+</file>
+
+<file path=ppt/comments/modernComment_117_98FC982C.xml><?xml version="1.0" encoding="utf-8"?>
+<p188:cmLst xmlns:a="http://schemas.openxmlformats.org/drawingml/2006/main" xmlns:r="http://schemas.openxmlformats.org/officeDocument/2006/relationships" xmlns:p188="http://schemas.microsoft.com/office/powerpoint/2018/8/main">
+  <p188:cm id="{55E8C031-4C1C-E64B-937E-AEE7D7AFF080}" authorId="{DE9CABDE-A937-59CB-0A64-97A3DF0832AF}" created="2024-12-08T05:19:33.500">
+    <pc:sldMkLst xmlns:pc="http://schemas.microsoft.com/office/powerpoint/2013/main/command">
+      <pc:docMk/>
+      <pc:sldMk cId="2566690860" sldId="279"/>
+    </pc:sldMkLst>
+    <p188:replyLst>
+      <p188:reply id="{7AFF1448-CBD1-104D-8BB9-7614FF958112}" authorId="{DE9CABDE-A937-59CB-0A64-97A3DF0832AF}" created="2024-12-08T05:21:31.915">
+        <p188:txBody>
+          <a:bodyPr/>
+          <a:lstStyle/>
+          <a:p>
+            <a:r>
+              <a:rPr lang="en-US"/>
+              <a:t>I moved the paragraph that was on the slide into the script. I think we should just talk about these things and make the visuals bigger. Will be easier for people to follow then if they are trying to read all of this at the same time as listen to us </a:t>
+            </a:r>
+          </a:p>
+        </p188:txBody>
+      </p188:reply>
+    </p188:replyLst>
+    <p188:txBody>
+      <a:bodyPr/>
+      <a:lstStyle/>
+      <a:p>
+        <a:r>
+          <a:rPr lang="en-US"/>
+          <a:t>Not sure what the script for this slide means</a:t>
+        </a:r>
+      </a:p>
+    </p188:txBody>
+  </p188:cm>
+</p188:cmLst>
+</file>
+
+<file path=ppt/comments/modernComment_118_1D065640.xml><?xml version="1.0" encoding="utf-8"?>
+<p188:cmLst xmlns:a="http://schemas.openxmlformats.org/drawingml/2006/main" xmlns:r="http://schemas.openxmlformats.org/officeDocument/2006/relationships" xmlns:p188="http://schemas.microsoft.com/office/powerpoint/2018/8/main">
+  <p188:cm id="{27B9C553-E2B8-9041-BD39-456914952698}" authorId="{DE9CABDE-A937-59CB-0A64-97A3DF0832AF}" created="2024-12-08T05:31:17.094">
+    <ac:txMkLst xmlns:ac="http://schemas.microsoft.com/office/drawing/2013/main/command">
+      <pc:docMk xmlns:pc="http://schemas.microsoft.com/office/powerpoint/2013/main/command"/>
+      <pc:sldMk xmlns:pc="http://schemas.microsoft.com/office/powerpoint/2013/main/command" cId="486954560" sldId="280"/>
+      <ac:spMk id="2" creationId="{23C2E1B0-5E3A-0C86-C7D3-F86EEAAFAC5D}"/>
+      <ac:txMk cp="0" len="1">
+        <ac:context len="35" hash="165569293"/>
+      </ac:txMk>
+    </ac:txMkLst>
+    <p188:pos x="9895398" y="631201"/>
+    <p188:txBody>
+      <a:bodyPr/>
+      <a:lstStyle/>
+      <a:p>
+        <a:r>
+          <a:rPr lang="en-US"/>
+          <a:t>I think this is a candidate slide to remove for time. Or we should try and declutter it (perhaps crop out the repeated titles and have common title with smaller labels for the differences)</a:t>
+        </a:r>
+      </a:p>
+    </p188:txBody>
+  </p188:cm>
+</p188:cmLst>
+</file>
+
+<file path=ppt/comments/modernComment_119_BACED092.xml><?xml version="1.0" encoding="utf-8"?>
+<p188:cmLst xmlns:a="http://schemas.openxmlformats.org/drawingml/2006/main" xmlns:r="http://schemas.openxmlformats.org/officeDocument/2006/relationships" xmlns:p188="http://schemas.microsoft.com/office/powerpoint/2018/8/main">
+  <p188:cm id="{2711D138-6977-B449-A7E1-49A0216B03C6}" authorId="{DE9CABDE-A937-59CB-0A64-97A3DF0832AF}" created="2024-12-08T05:48:11.593">
+    <pc:sldMkLst xmlns:pc="http://schemas.microsoft.com/office/powerpoint/2013/main/command">
+      <pc:docMk/>
+      <pc:sldMk cId="3134115986" sldId="281"/>
+    </pc:sldMkLst>
+    <p188:txBody>
+      <a:bodyPr/>
+      <a:lstStyle/>
+      <a:p>
+        <a:r>
+          <a:rPr lang="en-US"/>
+          <a:t>Let’s come up with abbreviations for the models to use consistently throughout</a:t>
+        </a:r>
+      </a:p>
+    </p188:txBody>
+  </p188:cm>
+</p188:cmLst>
+</file>
+
+<file path=ppt/comments/modernComment_11D_E06F63B3.xml><?xml version="1.0" encoding="utf-8"?>
+<p188:cmLst xmlns:a="http://schemas.openxmlformats.org/drawingml/2006/main" xmlns:r="http://schemas.openxmlformats.org/officeDocument/2006/relationships" xmlns:p188="http://schemas.microsoft.com/office/powerpoint/2018/8/main">
+  <p188:cm id="{49D538D5-A55C-3141-A4B2-74DE647E19F2}" authorId="{DE9CABDE-A937-59CB-0A64-97A3DF0832AF}" created="2024-12-08T05:43:02.685">
+    <pc:sldMkLst xmlns:pc="http://schemas.microsoft.com/office/powerpoint/2013/main/command">
+      <pc:docMk/>
+      <pc:sldMk cId="3765396403" sldId="285"/>
+    </pc:sldMkLst>
+    <p188:txBody>
+      <a:bodyPr/>
+      <a:lstStyle/>
+      <a:p>
+        <a:r>
+          <a:rPr lang="en-US"/>
+          <a:t>I think slide 19 is a better version of this since it’s a visual</a:t>
+        </a:r>
+      </a:p>
+    </p188:txBody>
+  </p188:cm>
+</p188:cmLst>
 </file>
 
 <file path=ppt/notesMasters/notesMaster1.xml><?xml version="1.0" encoding="utf-8"?>
@@ -216,7 +452,7 @@
           <a:p>
             <a:fld id="{D33985F3-2979-104D-ADCC-CB2D48EA7DC9}" type="datetimeFigureOut">
               <a:rPr lang="en-US" smtClean="0"/>
-              <a:t>12/6/24</a:t>
+              <a:t>12/7/24</a:t>
             </a:fld>
             <a:endParaRPr lang="en-US"/>
           </a:p>
@@ -1267,6 +1503,51 @@
               <a:t>This smaller range makes sense given the scale of images and text prompts in the trained data and how much variation there can be</a:t>
             </a:r>
           </a:p>
+          <a:p>
+            <a:endParaRPr lang="en-US" dirty="0"/>
+          </a:p>
+          <a:p>
+            <a:pPr marL="0" indent="0">
+              <a:buNone/>
+            </a:pPr>
+            <a:r>
+              <a:rPr lang="en-US" sz="1200" dirty="0"/>
+              <a:t>We used the cosine similarity scores to determine our association score. Note that there is a much smaller range for our predictions than ground truth, but the difference are overall still meaningful. </a:t>
+            </a:r>
+          </a:p>
+          <a:p>
+            <a:pPr marL="0" indent="0">
+              <a:buNone/>
+            </a:pPr>
+            <a:r>
+              <a:rPr lang="en-US" sz="1200" dirty="0"/>
+              <a:t>The max range of values across cosine similarity scores assigned by the </a:t>
+            </a:r>
+            <a:r>
+              <a:rPr lang="en-US" sz="1200" dirty="0" err="1"/>
+              <a:t>ViT</a:t>
+            </a:r>
+            <a:r>
+              <a:rPr lang="en-US" sz="1200" dirty="0"/>
+              <a:t> B-32 model was 0.1003.</a:t>
+            </a:r>
+          </a:p>
+          <a:p>
+            <a:pPr marL="0" indent="0">
+              <a:buNone/>
+            </a:pPr>
+            <a:endParaRPr lang="en-US" sz="1200" dirty="0"/>
+          </a:p>
+          <a:p>
+            <a:pPr marL="0" indent="0">
+              <a:buNone/>
+            </a:pPr>
+            <a:r>
+              <a:rPr lang="en-US" sz="1200" dirty="0"/>
+              <a:t>Throughout the rest of the results, we’ll be grouping the set of association scores across all colors for a single concept. We will compare the concept’s predicted color association scores to the ground truth scores using the Pearson Correlation Coefficient as our metric.</a:t>
+            </a:r>
+            <a:endParaRPr lang="en-US" dirty="0"/>
+          </a:p>
         </p:txBody>
       </p:sp>
       <p:sp>
@@ -1368,6 +1649,49 @@
             </a:pPr>
             <a:r>
               <a:rPr lang="en-US" sz="2800" dirty="0"/>
+              <a:t>Used many metrics but primarily Pearson Correlation Coefficient (PCC) and Spearman Rank Correlation (SRC). Many results show strong positive correlation, highlighted are values over .5)</a:t>
+            </a:r>
+          </a:p>
+          <a:p>
+            <a:pPr marL="0" marR="0" lvl="0" indent="0" algn="l" defTabSz="914400" rtl="0" eaLnBrk="1" fontAlgn="auto" latinLnBrk="0" hangingPunct="1">
+              <a:lnSpc>
+                <a:spcPct val="100000"/>
+              </a:lnSpc>
+              <a:spcBef>
+                <a:spcPts val="0"/>
+              </a:spcBef>
+              <a:spcAft>
+                <a:spcPts val="0"/>
+              </a:spcAft>
+              <a:buClrTx/>
+              <a:buSzTx/>
+              <a:buFontTx/>
+              <a:buNone/>
+              <a:tabLst/>
+              <a:defRPr/>
+            </a:pPr>
+            <a:endParaRPr lang="en-US" sz="2800" dirty="0"/>
+          </a:p>
+          <a:p>
+            <a:pPr marL="0" marR="0" lvl="0" indent="0" algn="l" defTabSz="914400" rtl="0" eaLnBrk="1" fontAlgn="auto" latinLnBrk="0" hangingPunct="1">
+              <a:lnSpc>
+                <a:spcPct val="100000"/>
+              </a:lnSpc>
+              <a:spcBef>
+                <a:spcPts val="0"/>
+              </a:spcBef>
+              <a:spcAft>
+                <a:spcPts val="0"/>
+              </a:spcAft>
+              <a:buClrTx/>
+              <a:buSzTx/>
+              <a:buFontTx/>
+              <a:buNone/>
+              <a:tabLst/>
+              <a:defRPr/>
+            </a:pPr>
+            <a:r>
+              <a:rPr lang="en-US" sz="2800" dirty="0"/>
               <a:t>PCC measures the </a:t>
             </a:r>
             <a:r>
@@ -1617,6 +1941,47 @@
           <a:bodyPr/>
           <a:lstStyle/>
           <a:p>
+            <a:pPr marL="0" marR="0" lvl="0" indent="0" algn="l" defTabSz="914400" rtl="0" eaLnBrk="1" fontAlgn="auto" latinLnBrk="0" hangingPunct="1">
+              <a:lnSpc>
+                <a:spcPct val="100000"/>
+              </a:lnSpc>
+              <a:spcBef>
+                <a:spcPts val="0"/>
+              </a:spcBef>
+              <a:spcAft>
+                <a:spcPts val="0"/>
+              </a:spcAft>
+              <a:buClrTx/>
+              <a:buSzTx/>
+              <a:buFontTx/>
+              <a:buNone/>
+              <a:tabLst/>
+              <a:defRPr/>
+            </a:pPr>
+            <a:r>
+              <a:rPr lang="en-US" sz="1200" dirty="0"/>
+              <a:t>Both models perform worse generally on less traditionally ‘colorable’ concepts like comfort, driving, and working. Though also perform worse on ‘mushroom’ which appears to show some high variability based on prompt style. </a:t>
+            </a:r>
+          </a:p>
+          <a:p>
+            <a:pPr marL="0" indent="0">
+              <a:buNone/>
+            </a:pPr>
+            <a:endParaRPr lang="en-US" sz="1200" dirty="0"/>
+          </a:p>
+          <a:p>
+            <a:pPr marL="0" indent="0">
+              <a:buNone/>
+            </a:pPr>
+            <a:endParaRPr lang="en-US" sz="1200" dirty="0"/>
+          </a:p>
+          <a:p>
+            <a:pPr marL="0" indent="0">
+              <a:buNone/>
+            </a:pPr>
+            <a:endParaRPr lang="en-US" sz="1200" dirty="0"/>
+          </a:p>
+          <a:p>
             <a:pPr marL="0" indent="0">
               <a:buNone/>
             </a:pPr>
@@ -2022,6 +2387,80 @@
         <p:txBody>
           <a:bodyPr/>
           <a:lstStyle/>
+          <a:p>
+            <a:pPr marL="0" marR="0" lvl="0" indent="0" algn="l" defTabSz="914400" rtl="0" eaLnBrk="1" fontAlgn="auto" latinLnBrk="0" hangingPunct="1">
+              <a:lnSpc>
+                <a:spcPct val="100000"/>
+              </a:lnSpc>
+              <a:spcBef>
+                <a:spcPts val="0"/>
+              </a:spcBef>
+              <a:spcAft>
+                <a:spcPts val="0"/>
+              </a:spcAft>
+              <a:buClrTx/>
+              <a:buSzTx/>
+              <a:buFontTx/>
+              <a:buNone/>
+              <a:tabLst/>
+              <a:defRPr/>
+            </a:pPr>
+            <a:r>
+              <a:rPr lang="en-US" sz="1200" dirty="0"/>
+              <a:t>Microsoft’s LLM2CLIP model outperformed the </a:t>
+            </a:r>
+            <a:r>
+              <a:rPr lang="en-US" sz="1200" dirty="0" err="1"/>
+              <a:t>ViT</a:t>
+            </a:r>
+            <a:r>
+              <a:rPr lang="en-US" sz="1200" dirty="0"/>
+              <a:t> B 32 Model on 12 out of the 20 concepts based on PCC</a:t>
+            </a:r>
+          </a:p>
+          <a:p>
+            <a:pPr marL="0" marR="0" lvl="0" indent="0" algn="l" defTabSz="914400" rtl="0" eaLnBrk="1" fontAlgn="auto" latinLnBrk="0" hangingPunct="1">
+              <a:lnSpc>
+                <a:spcPct val="100000"/>
+              </a:lnSpc>
+              <a:spcBef>
+                <a:spcPts val="0"/>
+              </a:spcBef>
+              <a:spcAft>
+                <a:spcPts val="0"/>
+              </a:spcAft>
+              <a:buClrTx/>
+              <a:buSzTx/>
+              <a:buFontTx/>
+              <a:buNone/>
+              <a:tabLst/>
+              <a:defRPr/>
+            </a:pPr>
+            <a:endParaRPr lang="en-US" sz="1200" dirty="0"/>
+          </a:p>
+          <a:p>
+            <a:pPr marL="0" marR="0" lvl="0" indent="0" algn="l" defTabSz="914400" rtl="0" eaLnBrk="1" fontAlgn="auto" latinLnBrk="0" hangingPunct="1">
+              <a:lnSpc>
+                <a:spcPct val="100000"/>
+              </a:lnSpc>
+              <a:spcBef>
+                <a:spcPts val="0"/>
+              </a:spcBef>
+              <a:spcAft>
+                <a:spcPts val="0"/>
+              </a:spcAft>
+              <a:buClrTx/>
+              <a:buSzTx/>
+              <a:buFontTx/>
+              <a:buNone/>
+              <a:tabLst/>
+              <a:defRPr/>
+            </a:pPr>
+            <a:r>
+              <a:rPr lang="en-US" sz="1200" dirty="0"/>
+              <a:t>Left to right is larger gaps to smaller gaps. Models perform similarly</a:t>
+            </a:r>
+          </a:p>
           <a:p>
             <a:endParaRPr lang="en-US" dirty="0"/>
           </a:p>
@@ -2329,7 +2768,10 @@
           <a:bodyPr/>
           <a:lstStyle/>
           <a:p>
-            <a:endParaRPr lang="en-US" dirty="0"/>
+            <a:r>
+              <a:rPr lang="en-US" dirty="0"/>
+              <a:t>Figure 3. Illustration of our pipeline for automatically extracting color distributions from images. The bottom flow (concepts to color ratings to human associations) describes the slow yet reliable direct approach using human experiments to determine ground truth associations. The top flow involves querying Google Images, extracting colors using a variety of different methods (features), then weighting those features appropriately to obtain estimated associations. Deciding which features to use and how to weight them is learned from human association data using sparse regression and cross-validation. Once the model is trained, color-concept associations can be quickly estimated for new concepts without additional human data.</a:t>
+            </a:r>
           </a:p>
         </p:txBody>
       </p:sp>
@@ -2431,7 +2873,10 @@
           <a:bodyPr/>
           <a:lstStyle/>
           <a:p>
-            <a:endParaRPr lang="en-US" dirty="0"/>
+            <a:r>
+              <a:rPr lang="en-US" dirty="0"/>
+              <a:t>Figure 2: Example trial from the human color-concept association rating task (left) and GPT-4 rating task for the same color-concept pair (right). Bar graphs correspond to average human and GPT-4 color concept association ratings for the concept “bird” over the entire UW-71 color library.</a:t>
+            </a:r>
           </a:p>
         </p:txBody>
       </p:sp>
@@ -2539,7 +2984,10 @@
           <a:bodyPr/>
           <a:lstStyle/>
           <a:p>
-            <a:endParaRPr lang="en-US" dirty="0"/>
+            <a:r>
+              <a:rPr lang="en-US" dirty="0"/>
+              <a:t>Fig 1: We introduce a method for automatically extracting color-concept associations from natural images. We apply a colorization neural network to predict color distributions for the input images. The distributions are transformed into ratings for a color library, which are then aggregated across multiple images of a concept to provide the color-concept associations.</a:t>
+            </a:r>
           </a:p>
         </p:txBody>
       </p:sp>
@@ -2629,7 +3077,18 @@
           <a:bodyPr/>
           <a:lstStyle/>
           <a:p>
-            <a:endParaRPr lang="en-US" dirty="0"/>
+            <a:r>
+              <a:rPr lang="en-US" dirty="0"/>
+              <a:t>Figure 1. Summary of our approach. While standard image models jointly train an image feature extractor and a linear classifier to predict some label, CLIP jointly trains an image encoder and a </a:t>
+            </a:r>
+            <a:r>
+              <a:rPr lang="en-US" dirty="0" err="1"/>
+              <a:t>atext</a:t>
+            </a:r>
+            <a:r>
+              <a:rPr lang="en-US" dirty="0"/>
+              <a:t> encoder to predict the correct pairings of a batch of (image, text) training examples. At test time the learned text encoder synthesizes a zero-shot linear classifier by embedding the names or descriptions of the target dataset’s classes.</a:t>
+            </a:r>
           </a:p>
         </p:txBody>
       </p:sp>
@@ -3114,7 +3573,7 @@
           <a:p>
             <a:fld id="{642920C1-925D-F74D-97F2-4206045562E1}" type="datetimeFigureOut">
               <a:rPr lang="en-US" smtClean="0"/>
-              <a:t>12/6/24</a:t>
+              <a:t>12/7/24</a:t>
             </a:fld>
             <a:endParaRPr lang="en-US"/>
           </a:p>
@@ -3312,7 +3771,7 @@
           <a:p>
             <a:fld id="{642920C1-925D-F74D-97F2-4206045562E1}" type="datetimeFigureOut">
               <a:rPr lang="en-US" smtClean="0"/>
-              <a:t>12/6/24</a:t>
+              <a:t>12/7/24</a:t>
             </a:fld>
             <a:endParaRPr lang="en-US"/>
           </a:p>
@@ -3520,7 +3979,7 @@
           <a:p>
             <a:fld id="{642920C1-925D-F74D-97F2-4206045562E1}" type="datetimeFigureOut">
               <a:rPr lang="en-US" smtClean="0"/>
-              <a:t>12/6/24</a:t>
+              <a:t>12/7/24</a:t>
             </a:fld>
             <a:endParaRPr lang="en-US"/>
           </a:p>
@@ -3718,7 +4177,7 @@
           <a:p>
             <a:fld id="{642920C1-925D-F74D-97F2-4206045562E1}" type="datetimeFigureOut">
               <a:rPr lang="en-US" smtClean="0"/>
-              <a:t>12/6/24</a:t>
+              <a:t>12/7/24</a:t>
             </a:fld>
             <a:endParaRPr lang="en-US"/>
           </a:p>
@@ -3993,7 +4452,7 @@
           <a:p>
             <a:fld id="{642920C1-925D-F74D-97F2-4206045562E1}" type="datetimeFigureOut">
               <a:rPr lang="en-US" smtClean="0"/>
-              <a:t>12/6/24</a:t>
+              <a:t>12/7/24</a:t>
             </a:fld>
             <a:endParaRPr lang="en-US"/>
           </a:p>
@@ -4258,7 +4717,7 @@
           <a:p>
             <a:fld id="{642920C1-925D-F74D-97F2-4206045562E1}" type="datetimeFigureOut">
               <a:rPr lang="en-US" smtClean="0"/>
-              <a:t>12/6/24</a:t>
+              <a:t>12/7/24</a:t>
             </a:fld>
             <a:endParaRPr lang="en-US"/>
           </a:p>
@@ -4670,7 +5129,7 @@
           <a:p>
             <a:fld id="{642920C1-925D-F74D-97F2-4206045562E1}" type="datetimeFigureOut">
               <a:rPr lang="en-US" smtClean="0"/>
-              <a:t>12/6/24</a:t>
+              <a:t>12/7/24</a:t>
             </a:fld>
             <a:endParaRPr lang="en-US"/>
           </a:p>
@@ -4811,7 +5270,7 @@
           <a:p>
             <a:fld id="{642920C1-925D-F74D-97F2-4206045562E1}" type="datetimeFigureOut">
               <a:rPr lang="en-US" smtClean="0"/>
-              <a:t>12/6/24</a:t>
+              <a:t>12/7/24</a:t>
             </a:fld>
             <a:endParaRPr lang="en-US"/>
           </a:p>
@@ -4924,7 +5383,7 @@
           <a:p>
             <a:fld id="{642920C1-925D-F74D-97F2-4206045562E1}" type="datetimeFigureOut">
               <a:rPr lang="en-US" smtClean="0"/>
-              <a:t>12/6/24</a:t>
+              <a:t>12/7/24</a:t>
             </a:fld>
             <a:endParaRPr lang="en-US"/>
           </a:p>
@@ -5235,7 +5694,7 @@
           <a:p>
             <a:fld id="{642920C1-925D-F74D-97F2-4206045562E1}" type="datetimeFigureOut">
               <a:rPr lang="en-US" smtClean="0"/>
-              <a:t>12/6/24</a:t>
+              <a:t>12/7/24</a:t>
             </a:fld>
             <a:endParaRPr lang="en-US"/>
           </a:p>
@@ -5523,7 +5982,7 @@
           <a:p>
             <a:fld id="{642920C1-925D-F74D-97F2-4206045562E1}" type="datetimeFigureOut">
               <a:rPr lang="en-US" smtClean="0"/>
-              <a:t>12/6/24</a:t>
+              <a:t>12/7/24</a:t>
             </a:fld>
             <a:endParaRPr lang="en-US"/>
           </a:p>
@@ -5764,7 +6223,7 @@
           <a:p>
             <a:fld id="{642920C1-925D-F74D-97F2-4206045562E1}" type="datetimeFigureOut">
               <a:rPr lang="en-US" smtClean="0"/>
-              <a:t>12/6/24</a:t>
+              <a:t>12/7/24</a:t>
             </a:fld>
             <a:endParaRPr lang="en-US"/>
           </a:p>
@@ -6279,8 +6738,8 @@
           <a:p>
             <a:pPr algn="l"/>
             <a:r>
-              <a:rPr lang="en-US" sz="5600"/>
-              <a:t>Do Multimodal Modals Show Evidence of Semantic Color Discriminability?</a:t>
+              <a:rPr lang="en-US" sz="5600" dirty="0"/>
+              <a:t>Do Multimodal Models Show Evidence of Semantic Color Discriminability?</a:t>
             </a:r>
           </a:p>
         </p:txBody>
@@ -7144,7 +7603,7 @@
           <a:lstStyle/>
           <a:p>
             <a:r>
-              <a:rPr lang="en-US" sz="4000"/>
+              <a:rPr lang="en-US" sz="4000" dirty="0"/>
               <a:t>Data</a:t>
             </a:r>
           </a:p>
@@ -7172,8 +7631,8 @@
         </p:blipFill>
         <p:spPr>
           <a:xfrm>
-            <a:off x="345733" y="176288"/>
-            <a:ext cx="2989586" cy="2989586"/>
+            <a:off x="160565" y="55209"/>
+            <a:ext cx="3448545" cy="3448545"/>
           </a:xfrm>
           <a:prstGeom prst="rect">
             <a:avLst/>
@@ -7202,8 +7661,8 @@
         </p:blipFill>
         <p:spPr>
           <a:xfrm>
-            <a:off x="3842467" y="176288"/>
-            <a:ext cx="2989586" cy="2989586"/>
+            <a:off x="3769676" y="117243"/>
+            <a:ext cx="3324479" cy="3324479"/>
           </a:xfrm>
           <a:prstGeom prst="rect">
             <a:avLst/>
@@ -7232,8 +7691,8 @@
         </p:blipFill>
         <p:spPr>
           <a:xfrm>
-            <a:off x="358918" y="3337589"/>
-            <a:ext cx="2963216" cy="2963216"/>
+            <a:off x="161969" y="3406851"/>
+            <a:ext cx="3447141" cy="3447141"/>
           </a:xfrm>
           <a:prstGeom prst="rect">
             <a:avLst/>
@@ -7262,8 +7721,8 @@
         </p:blipFill>
         <p:spPr>
           <a:xfrm>
-            <a:off x="3855652" y="3337589"/>
-            <a:ext cx="2963216" cy="2963216"/>
+            <a:off x="3708840" y="3449365"/>
+            <a:ext cx="3404627" cy="3404627"/>
           </a:xfrm>
           <a:prstGeom prst="rect">
             <a:avLst/>
@@ -7298,9 +7757,13 @@
           </a:bodyPr>
           <a:lstStyle/>
           <a:p>
-            <a:r>
-              <a:rPr lang="en-US" sz="2000" dirty="0"/>
-              <a:t>Data from Schloss Visual Reasoning Lab </a:t>
+            <a:pPr>
+              <a:buFontTx/>
+              <a:buChar char="-"/>
+            </a:pPr>
+            <a:r>
+              <a:rPr lang="en-US" sz="2400" dirty="0"/>
+              <a:t>Human trial color concept associations </a:t>
             </a:r>
           </a:p>
           <a:p>
@@ -7310,7 +7773,27 @@
             </a:pPr>
             <a:r>
               <a:rPr lang="en-US" sz="2000" dirty="0"/>
-              <a:t>Human Trial Color Concept Associations based on 20 concepts and 71 colors</a:t>
+              <a:t>20 concepts </a:t>
+            </a:r>
+          </a:p>
+          <a:p>
+            <a:pPr lvl="1">
+              <a:buFontTx/>
+              <a:buChar char="-"/>
+            </a:pPr>
+            <a:r>
+              <a:rPr lang="en-US" sz="2000" dirty="0"/>
+              <a:t>71 colors</a:t>
+            </a:r>
+          </a:p>
+          <a:p>
+            <a:pPr lvl="1">
+              <a:buFontTx/>
+              <a:buChar char="-"/>
+            </a:pPr>
+            <a:r>
+              <a:rPr lang="en-US" sz="2000" dirty="0"/>
+              <a:t>Courtesy of Schloss Visual Reasoning Lab</a:t>
             </a:r>
           </a:p>
           <a:p>
@@ -7535,7 +8018,7 @@
           <p:nvPr/>
         </p:nvPicPr>
         <p:blipFill>
-          <a:blip r:embed="rId3"/>
+          <a:blip r:embed="rId4"/>
           <a:stretch>
             <a:fillRect/>
           </a:stretch>
@@ -7565,7 +8048,7 @@
           <p:nvPr/>
         </p:nvPicPr>
         <p:blipFill>
-          <a:blip r:embed="rId4"/>
+          <a:blip r:embed="rId5"/>
           <a:stretch>
             <a:fillRect/>
           </a:stretch>
@@ -7595,7 +8078,7 @@
           <p:nvPr/>
         </p:nvPicPr>
         <p:blipFill>
-          <a:blip r:embed="rId5"/>
+          <a:blip r:embed="rId6"/>
           <a:stretch>
             <a:fillRect/>
           </a:stretch>
@@ -7625,7 +8108,7 @@
           <p:nvPr/>
         </p:nvPicPr>
         <p:blipFill>
-          <a:blip r:embed="rId6"/>
+          <a:blip r:embed="rId7"/>
           <a:stretch>
             <a:fillRect/>
           </a:stretch>
@@ -7655,7 +8138,7 @@
           <p:nvPr/>
         </p:nvPicPr>
         <p:blipFill>
-          <a:blip r:embed="rId7"/>
+          <a:blip r:embed="rId8"/>
           <a:stretch>
             <a:fillRect/>
           </a:stretch>
@@ -7685,7 +8168,7 @@
           <p:nvPr/>
         </p:nvPicPr>
         <p:blipFill>
-          <a:blip r:embed="rId8"/>
+          <a:blip r:embed="rId9"/>
           <a:stretch>
             <a:fillRect/>
           </a:stretch>
@@ -7715,7 +8198,7 @@
           <p:nvPr/>
         </p:nvPicPr>
         <p:blipFill>
-          <a:blip r:embed="rId9"/>
+          <a:blip r:embed="rId10"/>
           <a:stretch>
             <a:fillRect/>
           </a:stretch>
@@ -7745,7 +8228,7 @@
           <p:nvPr/>
         </p:nvPicPr>
         <p:blipFill>
-          <a:blip r:embed="rId10"/>
+          <a:blip r:embed="rId11"/>
           <a:stretch>
             <a:fillRect/>
           </a:stretch>
@@ -7799,6 +8282,45 @@
           </a:fontRef>
         </p:style>
       </p:cxnSp>
+      <p:sp>
+        <p:nvSpPr>
+          <p:cNvPr id="46" name="TextBox 45">
+            <a:extLst>
+              <a:ext uri="{FF2B5EF4-FFF2-40B4-BE49-F238E27FC236}">
+                <a16:creationId xmlns:a16="http://schemas.microsoft.com/office/drawing/2014/main" id="{934B9F55-61E7-A178-D108-FF328F4A9925}"/>
+              </a:ext>
+            </a:extLst>
+          </p:cNvPr>
+          <p:cNvSpPr txBox="1"/>
+          <p:nvPr/>
+        </p:nvSpPr>
+        <p:spPr>
+          <a:xfrm>
+            <a:off x="92764" y="6416638"/>
+            <a:ext cx="4571999" cy="369332"/>
+          </a:xfrm>
+          <a:prstGeom prst="rect">
+            <a:avLst/>
+          </a:prstGeom>
+          <a:solidFill>
+            <a:schemeClr val="bg1">
+              <a:alpha val="89000"/>
+            </a:schemeClr>
+          </a:solidFill>
+        </p:spPr>
+        <p:txBody>
+          <a:bodyPr wrap="square" rtlCol="0">
+            <a:spAutoFit/>
+          </a:bodyPr>
+          <a:lstStyle/>
+          <a:p>
+            <a:r>
+              <a:rPr lang="en-US" dirty="0"/>
+              <a:t>RGB images based on UW 71 CIELAB colors </a:t>
+            </a:r>
+          </a:p>
+        </p:txBody>
+      </p:sp>
       <p:cxnSp>
         <p:nvCxnSpPr>
           <p:cNvPr id="38" name="Straight Arrow Connector 37">
@@ -7861,7 +8383,9 @@
             <a:avLst/>
           </a:prstGeom>
           <a:solidFill>
-            <a:srgbClr val="65B39A"/>
+            <a:schemeClr val="accent6">
+              <a:lumMod val="75000"/>
+            </a:schemeClr>
           </a:solidFill>
         </p:spPr>
         <p:style>
@@ -8038,7 +8562,7 @@
         <p:spPr>
           <a:xfrm>
             <a:off x="138177" y="3473095"/>
-            <a:ext cx="3364062" cy="369332"/>
+            <a:ext cx="2011063" cy="369332"/>
           </a:xfrm>
           <a:prstGeom prst="rect">
             <a:avLst/>
@@ -8057,7 +8581,7 @@
           <a:p>
             <a:r>
               <a:rPr lang="en-US" dirty="0"/>
-              <a:t>For 3 different prompt scenarios</a:t>
+              <a:t>x3 prompt formats</a:t>
             </a:r>
           </a:p>
         </p:txBody>
@@ -8077,7 +8601,7 @@
           <p:nvPr/>
         </p:nvPicPr>
         <p:blipFill>
-          <a:blip r:embed="rId11"/>
+          <a:blip r:embed="rId12"/>
           <a:stretch>
             <a:fillRect/>
           </a:stretch>
@@ -8106,14 +8630,16 @@
         </p:nvSpPr>
         <p:spPr>
           <a:xfrm rot="5400000">
-            <a:off x="4091445" y="578792"/>
-            <a:ext cx="3485569" cy="2510971"/>
+            <a:off x="4064416" y="605820"/>
+            <a:ext cx="3539626" cy="2510971"/>
           </a:xfrm>
           <a:prstGeom prst="trapezoid">
             <a:avLst/>
           </a:prstGeom>
           <a:solidFill>
-            <a:srgbClr val="FD7B5D"/>
+            <a:schemeClr val="accent2">
+              <a:lumMod val="50000"/>
+            </a:schemeClr>
           </a:solidFill>
         </p:spPr>
         <p:style>
@@ -8138,45 +8664,6 @@
           <a:p>
             <a:pPr algn="ctr"/>
             <a:endParaRPr lang="en-US" dirty="0"/>
-          </a:p>
-        </p:txBody>
-      </p:sp>
-      <p:sp>
-        <p:nvSpPr>
-          <p:cNvPr id="46" name="TextBox 45">
-            <a:extLst>
-              <a:ext uri="{FF2B5EF4-FFF2-40B4-BE49-F238E27FC236}">
-                <a16:creationId xmlns:a16="http://schemas.microsoft.com/office/drawing/2014/main" id="{934B9F55-61E7-A178-D108-FF328F4A9925}"/>
-              </a:ext>
-            </a:extLst>
-          </p:cNvPr>
-          <p:cNvSpPr txBox="1"/>
-          <p:nvPr/>
-        </p:nvSpPr>
-        <p:spPr>
-          <a:xfrm>
-            <a:off x="190052" y="6416638"/>
-            <a:ext cx="4558556" cy="369332"/>
-          </a:xfrm>
-          <a:prstGeom prst="rect">
-            <a:avLst/>
-          </a:prstGeom>
-          <a:solidFill>
-            <a:schemeClr val="bg1">
-              <a:alpha val="89000"/>
-            </a:schemeClr>
-          </a:solidFill>
-        </p:spPr>
-        <p:txBody>
-          <a:bodyPr wrap="none" rtlCol="0">
-            <a:spAutoFit/>
-          </a:bodyPr>
-          <a:lstStyle/>
-          <a:p>
-            <a:r>
-              <a:rPr lang="en-US" dirty="0"/>
-              <a:t>RGB images based on UW 71 CIELAB colors </a:t>
-            </a:r>
           </a:p>
         </p:txBody>
       </p:sp>
@@ -9901,8 +10388,8 @@
         </p:nvSpPr>
         <p:spPr>
           <a:xfrm>
-            <a:off x="8566820" y="91493"/>
-            <a:ext cx="3454346" cy="1200329"/>
+            <a:off x="7852080" y="162832"/>
+            <a:ext cx="4044343" cy="400110"/>
           </a:xfrm>
           <a:prstGeom prst="rect">
             <a:avLst/>
@@ -9921,8 +10408,8 @@
           <a:p>
             <a:pPr algn="r"/>
             <a:r>
-              <a:rPr lang="en-US" dirty="0"/>
-              <a:t>We then get the Cosine Similarity Scores  for each concept-color pair which acts as our concept association score. </a:t>
+              <a:rPr lang="en-US" sz="2000" dirty="0"/>
+              <a:t>Color-concept association score:</a:t>
             </a:r>
           </a:p>
         </p:txBody>
@@ -9942,15 +10429,15 @@
           <p:nvPr/>
         </p:nvPicPr>
         <p:blipFill>
-          <a:blip r:embed="rId12"/>
+          <a:blip r:embed="rId13"/>
           <a:stretch>
             <a:fillRect/>
           </a:stretch>
         </p:blipFill>
         <p:spPr>
           <a:xfrm>
-            <a:off x="9482388" y="1230744"/>
-            <a:ext cx="2551615" cy="518735"/>
+            <a:off x="8750992" y="562576"/>
+            <a:ext cx="3274967" cy="665790"/>
           </a:xfrm>
           <a:prstGeom prst="rect">
             <a:avLst/>
@@ -9967,6 +10454,11 @@
   <p:clrMapOvr>
     <a:masterClrMapping/>
   </p:clrMapOvr>
+  <p:extLst>
+    <p:ext uri="{6950BFC3-D8DA-4A85-94F7-54DA5524770B}">
+      <p188:commentRel xmlns:p188="http://schemas.microsoft.com/office/powerpoint/2018/8/main" r:id="rId3"/>
+    </p:ext>
+  </p:extLst>
 </p:sld>
 </file>
 
@@ -12234,8 +12726,8 @@
         </p:nvSpPr>
         <p:spPr>
           <a:xfrm>
-            <a:off x="4654296" y="329184"/>
-            <a:ext cx="6894576" cy="1783080"/>
+            <a:off x="4654296" y="293932"/>
+            <a:ext cx="6894576" cy="1129218"/>
           </a:xfrm>
         </p:spPr>
         <p:txBody>
@@ -12245,208 +12737,12 @@
           <a:lstStyle/>
           <a:p>
             <a:r>
-              <a:rPr lang="en-US" sz="5400"/>
+              <a:rPr lang="en-US" sz="5400" dirty="0"/>
               <a:t>Results</a:t>
             </a:r>
           </a:p>
         </p:txBody>
       </p:sp>
-      <p:pic>
-        <p:nvPicPr>
-          <p:cNvPr id="9" name="Content Placeholder 8" descr="A graph of different colored lines&#10;&#10;Description automatically generated">
-            <a:extLst>
-              <a:ext uri="{FF2B5EF4-FFF2-40B4-BE49-F238E27FC236}">
-                <a16:creationId xmlns:a16="http://schemas.microsoft.com/office/drawing/2014/main" id="{E85B7C87-16F7-1090-43E3-934665E21875}"/>
-              </a:ext>
-            </a:extLst>
-          </p:cNvPr>
-          <p:cNvPicPr>
-            <a:picLocks noChangeAspect="1"/>
-          </p:cNvPicPr>
-          <p:nvPr/>
-        </p:nvPicPr>
-        <p:blipFill>
-          <a:blip r:embed="rId3"/>
-          <a:srcRect r="3631" b="-4"/>
-          <a:stretch/>
-        </p:blipFill>
-        <p:spPr>
-          <a:xfrm>
-            <a:off x="288572" y="-72788"/>
-            <a:ext cx="3639577" cy="3776861"/>
-          </a:xfrm>
-          <a:custGeom>
-            <a:avLst/>
-            <a:gdLst/>
-            <a:ahLst/>
-            <a:cxnLst/>
-            <a:rect l="l" t="t" r="r" b="b"/>
-            <a:pathLst>
-              <a:path w="4041336" h="4193763">
-                <a:moveTo>
-                  <a:pt x="0" y="0"/>
-                </a:moveTo>
-                <a:lnTo>
-                  <a:pt x="4019848" y="0"/>
-                </a:lnTo>
-                <a:lnTo>
-                  <a:pt x="4021195" y="11419"/>
-                </a:lnTo>
-                <a:cubicBezTo>
-                  <a:pt x="4036145" y="95184"/>
-                  <a:pt x="4033611" y="180091"/>
-                  <a:pt x="4037665" y="264364"/>
-                </a:cubicBezTo>
-                <a:cubicBezTo>
-                  <a:pt x="4042480" y="367421"/>
-                  <a:pt x="4036399" y="470858"/>
-                  <a:pt x="4034118" y="574168"/>
-                </a:cubicBezTo>
-                <a:cubicBezTo>
-                  <a:pt x="4032344" y="662121"/>
-                  <a:pt x="4023602" y="749948"/>
-                  <a:pt x="4026263" y="838028"/>
-                </a:cubicBezTo>
-                <a:cubicBezTo>
-                  <a:pt x="4026453" y="841074"/>
-                  <a:pt x="4026453" y="844120"/>
-                  <a:pt x="4026263" y="847166"/>
-                </a:cubicBezTo>
-                <a:cubicBezTo>
-                  <a:pt x="4018154" y="944003"/>
-                  <a:pt x="4018154" y="1041348"/>
-                  <a:pt x="4026263" y="1138186"/>
-                </a:cubicBezTo>
-                <a:cubicBezTo>
-                  <a:pt x="4028835" y="1178494"/>
-                  <a:pt x="4028113" y="1218943"/>
-                  <a:pt x="4024109" y="1259137"/>
-                </a:cubicBezTo>
-                <a:cubicBezTo>
-                  <a:pt x="4020308" y="1310285"/>
-                  <a:pt x="4008145" y="1362194"/>
-                  <a:pt x="4016887" y="1412960"/>
-                </a:cubicBezTo>
-                <a:cubicBezTo>
-                  <a:pt x="4022576" y="1454780"/>
-                  <a:pt x="4025705" y="1496916"/>
-                  <a:pt x="4026263" y="1539116"/>
-                </a:cubicBezTo>
-                <a:cubicBezTo>
-                  <a:pt x="4030697" y="1633542"/>
-                  <a:pt x="4026516" y="1728475"/>
-                  <a:pt x="4024869" y="1823155"/>
-                </a:cubicBezTo>
-                <a:cubicBezTo>
-                  <a:pt x="4023095" y="1933446"/>
-                  <a:pt x="4025883" y="2043737"/>
-                  <a:pt x="4017014" y="2154154"/>
-                </a:cubicBezTo>
-                <a:cubicBezTo>
-                  <a:pt x="4012136" y="2243351"/>
-                  <a:pt x="4012136" y="2332751"/>
-                  <a:pt x="4017014" y="2421948"/>
-                </a:cubicBezTo>
-                <a:cubicBezTo>
-                  <a:pt x="4019421" y="2503683"/>
-                  <a:pt x="4031711" y="2584656"/>
-                  <a:pt x="4029684" y="2667279"/>
-                </a:cubicBezTo>
-                <a:cubicBezTo>
-                  <a:pt x="4027276" y="2763608"/>
-                  <a:pt x="4015874" y="2859684"/>
-                  <a:pt x="4019421" y="2956268"/>
-                </a:cubicBezTo>
-                <a:cubicBezTo>
-                  <a:pt x="4021068" y="3002339"/>
-                  <a:pt x="4021195" y="3048410"/>
-                  <a:pt x="4022082" y="3094480"/>
-                </a:cubicBezTo>
-                <a:cubicBezTo>
-                  <a:pt x="4023222" y="3149943"/>
-                  <a:pt x="4033231" y="3205278"/>
-                  <a:pt x="4027656" y="3260614"/>
-                </a:cubicBezTo>
-                <a:cubicBezTo>
-                  <a:pt x="4018408" y="3352883"/>
-                  <a:pt x="3994462" y="3443628"/>
-                  <a:pt x="4009412" y="3538181"/>
-                </a:cubicBezTo>
-                <a:cubicBezTo>
-                  <a:pt x="4017647" y="3590217"/>
-                  <a:pt x="4026896" y="3642380"/>
-                  <a:pt x="4031711" y="3694923"/>
-                </a:cubicBezTo>
-                <a:cubicBezTo>
-                  <a:pt x="4035892" y="3741882"/>
-                  <a:pt x="4046407" y="3789603"/>
-                  <a:pt x="4038425" y="3836308"/>
-                </a:cubicBezTo>
-                <a:cubicBezTo>
-                  <a:pt x="4031584" y="3876287"/>
-                  <a:pt x="4035131" y="3916266"/>
-                  <a:pt x="4029810" y="3956245"/>
-                </a:cubicBezTo>
-                <a:cubicBezTo>
-                  <a:pt x="4022842" y="4008661"/>
-                  <a:pt x="4019168" y="4061966"/>
-                  <a:pt x="4013847" y="4114764"/>
-                </a:cubicBezTo>
-                <a:lnTo>
-                  <a:pt x="4010970" y="4161894"/>
-                </a:lnTo>
-                <a:lnTo>
-                  <a:pt x="4002764" y="4161042"/>
-                </a:lnTo>
-                <a:cubicBezTo>
-                  <a:pt x="3957904" y="4159210"/>
-                  <a:pt x="3912934" y="4160186"/>
-                  <a:pt x="3868108" y="4163980"/>
-                </a:cubicBezTo>
-                <a:cubicBezTo>
-                  <a:pt x="3637072" y="4178737"/>
-                  <a:pt x="3405779" y="4172076"/>
-                  <a:pt x="3174741" y="4175341"/>
-                </a:cubicBezTo>
-                <a:cubicBezTo>
-                  <a:pt x="2865668" y="4179782"/>
-                  <a:pt x="2556851" y="4168420"/>
-                  <a:pt x="2247906" y="4167376"/>
-                </a:cubicBezTo>
-                <a:cubicBezTo>
-                  <a:pt x="2184582" y="4167115"/>
-                  <a:pt x="2121002" y="4170510"/>
-                  <a:pt x="2057934" y="4175733"/>
-                </a:cubicBezTo>
-                <a:cubicBezTo>
-                  <a:pt x="1970560" y="4182786"/>
-                  <a:pt x="1884336" y="4173905"/>
-                  <a:pt x="1797729" y="4165547"/>
-                </a:cubicBezTo>
-                <a:cubicBezTo>
-                  <a:pt x="1693340" y="4155492"/>
-                  <a:pt x="1589207" y="4164372"/>
-                  <a:pt x="1485458" y="4175995"/>
-                </a:cubicBezTo>
-                <a:cubicBezTo>
-                  <a:pt x="1307344" y="4195571"/>
-                  <a:pt x="1127888" y="4198979"/>
-                  <a:pt x="949185" y="4186181"/>
-                </a:cubicBezTo>
-                <a:cubicBezTo>
-                  <a:pt x="751793" y="4172468"/>
-                  <a:pt x="554529" y="4174950"/>
-                  <a:pt x="357136" y="4175995"/>
-                </a:cubicBezTo>
-                <a:lnTo>
-                  <a:pt x="0" y="4175060"/>
-                </a:lnTo>
-                <a:close/>
-              </a:path>
-            </a:pathLst>
-          </a:custGeom>
-        </p:spPr>
-      </p:pic>
       <p:sp>
         <p:nvSpPr>
           <p:cNvPr id="18" name="sketch line">
@@ -12790,67 +13086,12 @@
           </a:p>
         </p:txBody>
       </p:sp>
-      <p:sp>
-        <p:nvSpPr>
-          <p:cNvPr id="13" name="Content Placeholder 12">
-            <a:extLst>
-              <a:ext uri="{FF2B5EF4-FFF2-40B4-BE49-F238E27FC236}">
-                <a16:creationId xmlns:a16="http://schemas.microsoft.com/office/drawing/2014/main" id="{970C6DD5-B845-DD50-09AD-B43F5FC3F055}"/>
-              </a:ext>
-            </a:extLst>
-          </p:cNvPr>
-          <p:cNvSpPr>
-            <a:spLocks noGrp="1"/>
-          </p:cNvSpPr>
-          <p:nvPr>
-            <p:ph idx="1"/>
-          </p:nvPr>
-        </p:nvSpPr>
-        <p:spPr>
-          <a:xfrm>
-            <a:off x="4654296" y="2706624"/>
-            <a:ext cx="6894576" cy="3483864"/>
-          </a:xfrm>
-        </p:spPr>
-        <p:txBody>
-          <a:bodyPr>
-            <a:normAutofit/>
-          </a:bodyPr>
-          <a:lstStyle/>
-          <a:p>
-            <a:pPr marL="0" indent="0">
-              <a:buNone/>
-            </a:pPr>
-            <a:r>
-              <a:rPr lang="en-US" sz="2200" dirty="0"/>
-              <a:t>We used the cosine similarity scores to determine our association score. Note that there is a much smaller range for our predictions than ground truth, but the difference are overall still meaningful. </a:t>
-            </a:r>
-          </a:p>
-          <a:p>
-            <a:pPr marL="0" indent="0">
-              <a:buNone/>
-            </a:pPr>
-            <a:r>
-              <a:rPr lang="en-US" sz="2200" dirty="0"/>
-              <a:t>The max range of values across cosine similarity scores assigned by the </a:t>
-            </a:r>
-            <a:r>
-              <a:rPr lang="en-US" sz="2200" dirty="0" err="1"/>
-              <a:t>ViT</a:t>
-            </a:r>
-            <a:r>
-              <a:rPr lang="en-US" sz="2200" dirty="0"/>
-              <a:t> B-32 model was 0.1003.</a:t>
-            </a:r>
-          </a:p>
-        </p:txBody>
-      </p:sp>
       <p:pic>
         <p:nvPicPr>
-          <p:cNvPr id="10" name="Picture 9" descr="A graph of different colored lines&#10;&#10;Description automatically generated">
-            <a:extLst>
-              <a:ext uri="{FF2B5EF4-FFF2-40B4-BE49-F238E27FC236}">
-                <a16:creationId xmlns:a16="http://schemas.microsoft.com/office/drawing/2014/main" id="{C149B672-916C-7D4B-0F6B-B4B4E965774D}"/>
+          <p:cNvPr id="8" name="Picture 7">
+            <a:extLst>
+              <a:ext uri="{FF2B5EF4-FFF2-40B4-BE49-F238E27FC236}">
+                <a16:creationId xmlns:a16="http://schemas.microsoft.com/office/drawing/2014/main" id="{91855A03-B897-708A-1FD9-9F84D29BD76B}"/>
               </a:ext>
             </a:extLst>
           </p:cNvPr>
@@ -12867,8 +13108,264 @@
         </p:blipFill>
         <p:spPr>
           <a:xfrm>
-            <a:off x="355607" y="3309732"/>
-            <a:ext cx="3658609" cy="3658609"/>
+            <a:off x="3580319" y="1383146"/>
+            <a:ext cx="5028314" cy="438980"/>
+          </a:xfrm>
+          <a:prstGeom prst="rect">
+            <a:avLst/>
+          </a:prstGeom>
+        </p:spPr>
+      </p:pic>
+      <p:pic>
+        <p:nvPicPr>
+          <p:cNvPr id="12" name="Picture 11" descr="A white background with black dots&#10;&#10;Description automatically generated">
+            <a:extLst>
+              <a:ext uri="{FF2B5EF4-FFF2-40B4-BE49-F238E27FC236}">
+                <a16:creationId xmlns:a16="http://schemas.microsoft.com/office/drawing/2014/main" id="{DE8893ED-7D04-C0BC-8108-D3EE5A313596}"/>
+              </a:ext>
+            </a:extLst>
+          </p:cNvPr>
+          <p:cNvPicPr>
+            <a:picLocks noChangeAspect="1"/>
+          </p:cNvPicPr>
+          <p:nvPr/>
+        </p:nvPicPr>
+        <p:blipFill>
+          <a:blip r:embed="rId5"/>
+          <a:stretch>
+            <a:fillRect/>
+          </a:stretch>
+        </p:blipFill>
+        <p:spPr>
+          <a:xfrm>
+            <a:off x="4494970" y="2125013"/>
+            <a:ext cx="4821308" cy="673100"/>
+          </a:xfrm>
+          <a:prstGeom prst="rect">
+            <a:avLst/>
+          </a:prstGeom>
+        </p:spPr>
+      </p:pic>
+      <p:pic>
+        <p:nvPicPr>
+          <p:cNvPr id="9" name="Content Placeholder 8" descr="A graph of different colored lines&#10;&#10;Description automatically generated">
+            <a:extLst>
+              <a:ext uri="{FF2B5EF4-FFF2-40B4-BE49-F238E27FC236}">
+                <a16:creationId xmlns:a16="http://schemas.microsoft.com/office/drawing/2014/main" id="{E85B7C87-16F7-1090-43E3-934665E21875}"/>
+              </a:ext>
+            </a:extLst>
+          </p:cNvPr>
+          <p:cNvPicPr>
+            <a:picLocks noChangeAspect="1"/>
+          </p:cNvPicPr>
+          <p:nvPr/>
+        </p:nvPicPr>
+        <p:blipFill>
+          <a:blip r:embed="rId6"/>
+          <a:srcRect r="3631" b="-4"/>
+          <a:stretch/>
+        </p:blipFill>
+        <p:spPr>
+          <a:xfrm>
+            <a:off x="6705600" y="1913108"/>
+            <a:ext cx="4905626" cy="5090664"/>
+          </a:xfrm>
+          <a:custGeom>
+            <a:avLst/>
+            <a:gdLst/>
+            <a:ahLst/>
+            <a:cxnLst/>
+            <a:rect l="l" t="t" r="r" b="b"/>
+            <a:pathLst>
+              <a:path w="4041336" h="4193763">
+                <a:moveTo>
+                  <a:pt x="0" y="0"/>
+                </a:moveTo>
+                <a:lnTo>
+                  <a:pt x="4019848" y="0"/>
+                </a:lnTo>
+                <a:lnTo>
+                  <a:pt x="4021195" y="11419"/>
+                </a:lnTo>
+                <a:cubicBezTo>
+                  <a:pt x="4036145" y="95184"/>
+                  <a:pt x="4033611" y="180091"/>
+                  <a:pt x="4037665" y="264364"/>
+                </a:cubicBezTo>
+                <a:cubicBezTo>
+                  <a:pt x="4042480" y="367421"/>
+                  <a:pt x="4036399" y="470858"/>
+                  <a:pt x="4034118" y="574168"/>
+                </a:cubicBezTo>
+                <a:cubicBezTo>
+                  <a:pt x="4032344" y="662121"/>
+                  <a:pt x="4023602" y="749948"/>
+                  <a:pt x="4026263" y="838028"/>
+                </a:cubicBezTo>
+                <a:cubicBezTo>
+                  <a:pt x="4026453" y="841074"/>
+                  <a:pt x="4026453" y="844120"/>
+                  <a:pt x="4026263" y="847166"/>
+                </a:cubicBezTo>
+                <a:cubicBezTo>
+                  <a:pt x="4018154" y="944003"/>
+                  <a:pt x="4018154" y="1041348"/>
+                  <a:pt x="4026263" y="1138186"/>
+                </a:cubicBezTo>
+                <a:cubicBezTo>
+                  <a:pt x="4028835" y="1178494"/>
+                  <a:pt x="4028113" y="1218943"/>
+                  <a:pt x="4024109" y="1259137"/>
+                </a:cubicBezTo>
+                <a:cubicBezTo>
+                  <a:pt x="4020308" y="1310285"/>
+                  <a:pt x="4008145" y="1362194"/>
+                  <a:pt x="4016887" y="1412960"/>
+                </a:cubicBezTo>
+                <a:cubicBezTo>
+                  <a:pt x="4022576" y="1454780"/>
+                  <a:pt x="4025705" y="1496916"/>
+                  <a:pt x="4026263" y="1539116"/>
+                </a:cubicBezTo>
+                <a:cubicBezTo>
+                  <a:pt x="4030697" y="1633542"/>
+                  <a:pt x="4026516" y="1728475"/>
+                  <a:pt x="4024869" y="1823155"/>
+                </a:cubicBezTo>
+                <a:cubicBezTo>
+                  <a:pt x="4023095" y="1933446"/>
+                  <a:pt x="4025883" y="2043737"/>
+                  <a:pt x="4017014" y="2154154"/>
+                </a:cubicBezTo>
+                <a:cubicBezTo>
+                  <a:pt x="4012136" y="2243351"/>
+                  <a:pt x="4012136" y="2332751"/>
+                  <a:pt x="4017014" y="2421948"/>
+                </a:cubicBezTo>
+                <a:cubicBezTo>
+                  <a:pt x="4019421" y="2503683"/>
+                  <a:pt x="4031711" y="2584656"/>
+                  <a:pt x="4029684" y="2667279"/>
+                </a:cubicBezTo>
+                <a:cubicBezTo>
+                  <a:pt x="4027276" y="2763608"/>
+                  <a:pt x="4015874" y="2859684"/>
+                  <a:pt x="4019421" y="2956268"/>
+                </a:cubicBezTo>
+                <a:cubicBezTo>
+                  <a:pt x="4021068" y="3002339"/>
+                  <a:pt x="4021195" y="3048410"/>
+                  <a:pt x="4022082" y="3094480"/>
+                </a:cubicBezTo>
+                <a:cubicBezTo>
+                  <a:pt x="4023222" y="3149943"/>
+                  <a:pt x="4033231" y="3205278"/>
+                  <a:pt x="4027656" y="3260614"/>
+                </a:cubicBezTo>
+                <a:cubicBezTo>
+                  <a:pt x="4018408" y="3352883"/>
+                  <a:pt x="3994462" y="3443628"/>
+                  <a:pt x="4009412" y="3538181"/>
+                </a:cubicBezTo>
+                <a:cubicBezTo>
+                  <a:pt x="4017647" y="3590217"/>
+                  <a:pt x="4026896" y="3642380"/>
+                  <a:pt x="4031711" y="3694923"/>
+                </a:cubicBezTo>
+                <a:cubicBezTo>
+                  <a:pt x="4035892" y="3741882"/>
+                  <a:pt x="4046407" y="3789603"/>
+                  <a:pt x="4038425" y="3836308"/>
+                </a:cubicBezTo>
+                <a:cubicBezTo>
+                  <a:pt x="4031584" y="3876287"/>
+                  <a:pt x="4035131" y="3916266"/>
+                  <a:pt x="4029810" y="3956245"/>
+                </a:cubicBezTo>
+                <a:cubicBezTo>
+                  <a:pt x="4022842" y="4008661"/>
+                  <a:pt x="4019168" y="4061966"/>
+                  <a:pt x="4013847" y="4114764"/>
+                </a:cubicBezTo>
+                <a:lnTo>
+                  <a:pt x="4010970" y="4161894"/>
+                </a:lnTo>
+                <a:lnTo>
+                  <a:pt x="4002764" y="4161042"/>
+                </a:lnTo>
+                <a:cubicBezTo>
+                  <a:pt x="3957904" y="4159210"/>
+                  <a:pt x="3912934" y="4160186"/>
+                  <a:pt x="3868108" y="4163980"/>
+                </a:cubicBezTo>
+                <a:cubicBezTo>
+                  <a:pt x="3637072" y="4178737"/>
+                  <a:pt x="3405779" y="4172076"/>
+                  <a:pt x="3174741" y="4175341"/>
+                </a:cubicBezTo>
+                <a:cubicBezTo>
+                  <a:pt x="2865668" y="4179782"/>
+                  <a:pt x="2556851" y="4168420"/>
+                  <a:pt x="2247906" y="4167376"/>
+                </a:cubicBezTo>
+                <a:cubicBezTo>
+                  <a:pt x="2184582" y="4167115"/>
+                  <a:pt x="2121002" y="4170510"/>
+                  <a:pt x="2057934" y="4175733"/>
+                </a:cubicBezTo>
+                <a:cubicBezTo>
+                  <a:pt x="1970560" y="4182786"/>
+                  <a:pt x="1884336" y="4173905"/>
+                  <a:pt x="1797729" y="4165547"/>
+                </a:cubicBezTo>
+                <a:cubicBezTo>
+                  <a:pt x="1693340" y="4155492"/>
+                  <a:pt x="1589207" y="4164372"/>
+                  <a:pt x="1485458" y="4175995"/>
+                </a:cubicBezTo>
+                <a:cubicBezTo>
+                  <a:pt x="1307344" y="4195571"/>
+                  <a:pt x="1127888" y="4198979"/>
+                  <a:pt x="949185" y="4186181"/>
+                </a:cubicBezTo>
+                <a:cubicBezTo>
+                  <a:pt x="751793" y="4172468"/>
+                  <a:pt x="554529" y="4174950"/>
+                  <a:pt x="357136" y="4175995"/>
+                </a:cubicBezTo>
+                <a:lnTo>
+                  <a:pt x="0" y="4175060"/>
+                </a:lnTo>
+                <a:close/>
+              </a:path>
+            </a:pathLst>
+          </a:custGeom>
+        </p:spPr>
+      </p:pic>
+      <p:pic>
+        <p:nvPicPr>
+          <p:cNvPr id="10" name="Picture 9" descr="A graph of different colored lines&#10;&#10;Description automatically generated">
+            <a:extLst>
+              <a:ext uri="{FF2B5EF4-FFF2-40B4-BE49-F238E27FC236}">
+                <a16:creationId xmlns:a16="http://schemas.microsoft.com/office/drawing/2014/main" id="{C149B672-916C-7D4B-0F6B-B4B4E965774D}"/>
+              </a:ext>
+            </a:extLst>
+          </p:cNvPr>
+          <p:cNvPicPr>
+            <a:picLocks noChangeAspect="1"/>
+          </p:cNvPicPr>
+          <p:nvPr/>
+        </p:nvPicPr>
+        <p:blipFill>
+          <a:blip r:embed="rId7"/>
+          <a:stretch>
+            <a:fillRect/>
+          </a:stretch>
+        </p:blipFill>
+        <p:spPr>
+          <a:xfrm>
+            <a:off x="1066162" y="1836350"/>
+            <a:ext cx="5144304" cy="5144304"/>
           </a:xfrm>
           <a:prstGeom prst="rect">
             <a:avLst/>
@@ -12885,11 +13382,16 @@
   <p:clrMapOvr>
     <a:masterClrMapping/>
   </p:clrMapOvr>
+  <p:extLst>
+    <p:ext uri="{6950BFC3-D8DA-4A85-94F7-54DA5524770B}">
+      <p188:commentRel xmlns:p188="http://schemas.microsoft.com/office/powerpoint/2018/8/main" r:id="rId3"/>
+    </p:ext>
+  </p:extLst>
 </p:sld>
 </file>
 
 <file path=ppt/slides/slide17.xml><?xml version="1.0" encoding="utf-8"?>
-<p:sld xmlns:a="http://schemas.openxmlformats.org/drawingml/2006/main" xmlns:r="http://schemas.openxmlformats.org/officeDocument/2006/relationships" xmlns:p="http://schemas.openxmlformats.org/presentationml/2006/main">
+<p:sld xmlns:a="http://schemas.openxmlformats.org/drawingml/2006/main" xmlns:r="http://schemas.openxmlformats.org/officeDocument/2006/relationships" xmlns:p="http://schemas.openxmlformats.org/presentationml/2006/main" show="0">
   <p:cSld>
     <p:bg>
       <p:bgPr>
@@ -12991,8 +13493,8 @@
         </p:nvSpPr>
         <p:spPr>
           <a:xfrm>
-            <a:off x="630936" y="640080"/>
-            <a:ext cx="4818888" cy="1481328"/>
+            <a:off x="643278" y="422696"/>
+            <a:ext cx="4818888" cy="978275"/>
           </a:xfrm>
         </p:spPr>
         <p:txBody>
@@ -13003,13 +13505,8 @@
           <a:p>
             <a:r>
               <a:rPr lang="en-US" sz="5000" dirty="0"/>
-              <a:t>Exp 1 &amp; 2: </a:t>
-            </a:r>
-            <a:r>
-              <a:rPr lang="en-US" sz="3600" dirty="0"/>
-              <a:t>prompt 1</a:t>
-            </a:r>
-            <a:endParaRPr lang="en-US" sz="5000" dirty="0"/>
+              <a:t>Exp 1 &amp; 2:</a:t>
+            </a:r>
           </a:p>
         </p:txBody>
       </p:sp>
@@ -13286,12 +13783,101 @@
           </a:p>
         </p:txBody>
       </p:sp>
-      <p:sp>
-        <p:nvSpPr>
-          <p:cNvPr id="7" name="Content Placeholder 6">
-            <a:extLst>
-              <a:ext uri="{FF2B5EF4-FFF2-40B4-BE49-F238E27FC236}">
-                <a16:creationId xmlns:a16="http://schemas.microsoft.com/office/drawing/2014/main" id="{853EEAA7-DD6E-B712-6B8E-B24890020073}"/>
+      <p:pic>
+        <p:nvPicPr>
+          <p:cNvPr id="6" name="Picture 5">
+            <a:extLst>
+              <a:ext uri="{FF2B5EF4-FFF2-40B4-BE49-F238E27FC236}">
+                <a16:creationId xmlns:a16="http://schemas.microsoft.com/office/drawing/2014/main" id="{62AFCDB1-6009-8334-2992-32307C4E4B9E}"/>
+              </a:ext>
+            </a:extLst>
+          </p:cNvPr>
+          <p:cNvPicPr>
+            <a:picLocks noChangeAspect="1"/>
+          </p:cNvPicPr>
+          <p:nvPr/>
+        </p:nvPicPr>
+        <p:blipFill>
+          <a:blip r:embed="rId4"/>
+          <a:stretch>
+            <a:fillRect/>
+          </a:stretch>
+        </p:blipFill>
+        <p:spPr>
+          <a:xfrm>
+            <a:off x="608476" y="1448576"/>
+            <a:ext cx="3500818" cy="546100"/>
+          </a:xfrm>
+          <a:prstGeom prst="rect">
+            <a:avLst/>
+          </a:prstGeom>
+        </p:spPr>
+      </p:pic>
+      <p:pic>
+        <p:nvPicPr>
+          <p:cNvPr id="9" name="Picture 8">
+            <a:extLst>
+              <a:ext uri="{FF2B5EF4-FFF2-40B4-BE49-F238E27FC236}">
+                <a16:creationId xmlns:a16="http://schemas.microsoft.com/office/drawing/2014/main" id="{A6FE9DE1-A038-CDF6-DB41-3A12955E4D4C}"/>
+              </a:ext>
+            </a:extLst>
+          </p:cNvPr>
+          <p:cNvPicPr>
+            <a:picLocks noChangeAspect="1"/>
+          </p:cNvPicPr>
+          <p:nvPr/>
+        </p:nvPicPr>
+        <p:blipFill>
+          <a:blip r:embed="rId5"/>
+          <a:stretch>
+            <a:fillRect/>
+          </a:stretch>
+        </p:blipFill>
+        <p:spPr>
+          <a:xfrm>
+            <a:off x="371558" y="1994676"/>
+            <a:ext cx="3737736" cy="469900"/>
+          </a:xfrm>
+          <a:prstGeom prst="rect">
+            <a:avLst/>
+          </a:prstGeom>
+        </p:spPr>
+      </p:pic>
+      <p:pic>
+        <p:nvPicPr>
+          <p:cNvPr id="5" name="Picture 4" descr="A table with numbers and letters&#10;&#10;Description automatically generated">
+            <a:extLst>
+              <a:ext uri="{FF2B5EF4-FFF2-40B4-BE49-F238E27FC236}">
+                <a16:creationId xmlns:a16="http://schemas.microsoft.com/office/drawing/2014/main" id="{EE1927E9-93B5-0DDE-6604-4F7869AA3E83}"/>
+              </a:ext>
+            </a:extLst>
+          </p:cNvPr>
+          <p:cNvPicPr>
+            <a:picLocks noChangeAspect="1"/>
+          </p:cNvPicPr>
+          <p:nvPr/>
+        </p:nvPicPr>
+        <p:blipFill>
+          <a:blip r:embed="rId6"/>
+          <a:srcRect t="12505" b="10771"/>
+          <a:stretch/>
+        </p:blipFill>
+        <p:spPr>
+          <a:xfrm>
+            <a:off x="3412778" y="1942965"/>
+            <a:ext cx="8516933" cy="4900920"/>
+          </a:xfrm>
+          <a:prstGeom prst="rect">
+            <a:avLst/>
+          </a:prstGeom>
+        </p:spPr>
+      </p:pic>
+      <p:sp>
+        <p:nvSpPr>
+          <p:cNvPr id="10" name="Content Placeholder 2">
+            <a:extLst>
+              <a:ext uri="{FF2B5EF4-FFF2-40B4-BE49-F238E27FC236}">
+                <a16:creationId xmlns:a16="http://schemas.microsoft.com/office/drawing/2014/main" id="{8FDAED1F-2C50-7C2F-CC89-63A9E5B70031}"/>
               </a:ext>
             </a:extLst>
           </p:cNvPr>
@@ -13304,56 +13890,50 @@
         </p:nvSpPr>
         <p:spPr>
           <a:xfrm>
-            <a:off x="630936" y="2660904"/>
-            <a:ext cx="4818888" cy="3547872"/>
+            <a:off x="371558" y="2536670"/>
+            <a:ext cx="3389451" cy="3699376"/>
           </a:xfrm>
         </p:spPr>
         <p:txBody>
-          <a:bodyPr anchor="t">
+          <a:bodyPr>
             <a:normAutofit/>
           </a:bodyPr>
           <a:lstStyle/>
           <a:p>
-            <a:pPr marL="0" indent="0">
-              <a:buNone/>
+            <a:pPr>
+              <a:buFontTx/>
+              <a:buChar char="-"/>
             </a:pPr>
             <a:r>
-              <a:rPr lang="en-US" sz="2200" dirty="0"/>
-              <a:t>Used many metrics but primarily Pearson Correlation Coefficient (PCC) and Spearman Rank Correlation (SRC). Many results show strong positive correlation, highlighted are values over .5)</a:t>
-            </a:r>
+              <a:rPr lang="en-US" sz="2400" dirty="0"/>
+              <a:t>Comparison of predicted and ground truth association scores</a:t>
+            </a:r>
+          </a:p>
+          <a:p>
+            <a:pPr lvl="1">
+              <a:buFontTx/>
+              <a:buChar char="-"/>
+            </a:pPr>
+            <a:r>
+              <a:rPr lang="en-US" sz="2000" dirty="0"/>
+              <a:t>Pearson Correlation Coefficient (PCC)</a:t>
+            </a:r>
+          </a:p>
+          <a:p>
+            <a:pPr lvl="1">
+              <a:buFontTx/>
+              <a:buChar char="-"/>
+            </a:pPr>
+            <a:r>
+              <a:rPr lang="en-US" sz="2000" dirty="0"/>
+              <a:t>Spearman Rank Correlation (SRC)</a:t>
+            </a:r>
+          </a:p>
+          <a:p>
+            <a:endParaRPr lang="en-US" sz="2000" dirty="0"/>
           </a:p>
         </p:txBody>
       </p:sp>
-      <p:pic>
-        <p:nvPicPr>
-          <p:cNvPr id="5" name="Picture 4" descr="A table with numbers and letters&#10;&#10;Description automatically generated">
-            <a:extLst>
-              <a:ext uri="{FF2B5EF4-FFF2-40B4-BE49-F238E27FC236}">
-                <a16:creationId xmlns:a16="http://schemas.microsoft.com/office/drawing/2014/main" id="{EE1927E9-93B5-0DDE-6604-4F7869AA3E83}"/>
-              </a:ext>
-            </a:extLst>
-          </p:cNvPr>
-          <p:cNvPicPr>
-            <a:picLocks noChangeAspect="1"/>
-          </p:cNvPicPr>
-          <p:nvPr/>
-        </p:nvPicPr>
-        <p:blipFill>
-          <a:blip r:embed="rId3"/>
-          <a:stretch>
-            <a:fillRect/>
-          </a:stretch>
-        </p:blipFill>
-        <p:spPr>
-          <a:xfrm>
-            <a:off x="5766816" y="1138427"/>
-            <a:ext cx="6108192" cy="4581146"/>
-          </a:xfrm>
-          <a:prstGeom prst="rect">
-            <a:avLst/>
-          </a:prstGeom>
-        </p:spPr>
-      </p:pic>
     </p:spTree>
     <p:extLst>
       <p:ext uri="{BB962C8B-B14F-4D97-AF65-F5344CB8AC3E}">
@@ -13364,11 +13944,16 @@
   <p:clrMapOvr>
     <a:masterClrMapping/>
   </p:clrMapOvr>
+  <p:extLst>
+    <p:ext uri="{6950BFC3-D8DA-4A85-94F7-54DA5524770B}">
+      <p188:commentRel xmlns:p188="http://schemas.microsoft.com/office/powerpoint/2018/8/main" r:id="rId3"/>
+    </p:ext>
+  </p:extLst>
 </p:sld>
 </file>
 
 <file path=ppt/slides/slide18.xml><?xml version="1.0" encoding="utf-8"?>
-<p:sld xmlns:a="http://schemas.openxmlformats.org/drawingml/2006/main" xmlns:r="http://schemas.openxmlformats.org/officeDocument/2006/relationships" xmlns:p="http://schemas.openxmlformats.org/presentationml/2006/main">
+<p:sld xmlns:a="http://schemas.openxmlformats.org/drawingml/2006/main" xmlns:r="http://schemas.openxmlformats.org/officeDocument/2006/relationships" xmlns:p="http://schemas.openxmlformats.org/presentationml/2006/main" show="0">
   <p:cSld>
     <p:bg>
       <p:bgPr>
@@ -13482,8 +14067,8 @@
           <a:p>
             <a:pPr algn="ctr"/>
             <a:r>
-              <a:rPr lang="en-US" sz="5400"/>
-              <a:t>Correlation Visual Comparison</a:t>
+              <a:rPr lang="en-US" sz="5400" dirty="0"/>
+              <a:t>Predicted vs Ground Truth Rankings</a:t>
             </a:r>
           </a:p>
         </p:txBody>
@@ -13846,7 +14431,7 @@
           <p:nvPr/>
         </p:nvPicPr>
         <p:blipFill>
-          <a:blip r:embed="rId3"/>
+          <a:blip r:embed="rId4"/>
           <a:stretch>
             <a:fillRect/>
           </a:stretch>
@@ -13876,7 +14461,7 @@
           <p:nvPr/>
         </p:nvPicPr>
         <p:blipFill>
-          <a:blip r:embed="rId4"/>
+          <a:blip r:embed="rId5"/>
           <a:stretch>
             <a:fillRect/>
           </a:stretch>
@@ -13906,7 +14491,7 @@
           <p:nvPr/>
         </p:nvPicPr>
         <p:blipFill>
-          <a:blip r:embed="rId5"/>
+          <a:blip r:embed="rId6"/>
           <a:stretch>
             <a:fillRect/>
           </a:stretch>
@@ -13938,7 +14523,7 @@
           </p:nvPr>
         </p:nvPicPr>
         <p:blipFill>
-          <a:blip r:embed="rId6"/>
+          <a:blip r:embed="rId7"/>
           <a:stretch>
             <a:fillRect/>
           </a:stretch>
@@ -13963,6 +14548,11 @@
   <p:clrMapOvr>
     <a:masterClrMapping/>
   </p:clrMapOvr>
+  <p:extLst>
+    <p:ext uri="{6950BFC3-D8DA-4A85-94F7-54DA5524770B}">
+      <p188:commentRel xmlns:p188="http://schemas.microsoft.com/office/powerpoint/2018/8/main" r:id="rId3"/>
+    </p:ext>
+  </p:extLst>
 </p:sld>
 </file>
 
@@ -14009,57 +14599,19 @@
         </p:nvSpPr>
         <p:spPr>
           <a:xfrm>
-            <a:off x="7155543" y="229281"/>
-            <a:ext cx="4553853" cy="1628775"/>
+            <a:off x="1693148" y="340316"/>
+            <a:ext cx="9462052" cy="784630"/>
           </a:xfrm>
         </p:spPr>
         <p:txBody>
           <a:bodyPr anchor="b">
-            <a:normAutofit fontScale="90000"/>
+            <a:noAutofit/>
           </a:bodyPr>
           <a:lstStyle/>
           <a:p>
             <a:r>
-              <a:rPr lang="en-US" sz="3100" dirty="0"/>
-              <a:t>Prompt Comparison via Pearson Correlation Coefficient (PCC) Values by Concept</a:t>
-            </a:r>
-          </a:p>
-        </p:txBody>
-      </p:sp>
-      <p:sp>
-        <p:nvSpPr>
-          <p:cNvPr id="20" name="Content Placeholder 12">
-            <a:extLst>
-              <a:ext uri="{FF2B5EF4-FFF2-40B4-BE49-F238E27FC236}">
-                <a16:creationId xmlns:a16="http://schemas.microsoft.com/office/drawing/2014/main" id="{72F96F7C-140F-C71B-76D1-32272D6F4292}"/>
-              </a:ext>
-            </a:extLst>
-          </p:cNvPr>
-          <p:cNvSpPr>
-            <a:spLocks noGrp="1"/>
-          </p:cNvSpPr>
-          <p:nvPr>
-            <p:ph idx="1"/>
-          </p:nvPr>
-        </p:nvSpPr>
-        <p:spPr>
-          <a:xfrm>
-            <a:off x="7155543" y="4541500"/>
-            <a:ext cx="4553854" cy="2316500"/>
-          </a:xfrm>
-        </p:spPr>
-        <p:txBody>
-          <a:bodyPr>
-            <a:normAutofit/>
-          </a:bodyPr>
-          <a:lstStyle/>
-          <a:p>
-            <a:pPr marL="0" indent="0">
-              <a:buNone/>
-            </a:pPr>
-            <a:r>
-              <a:rPr lang="en-US" sz="1800" dirty="0"/>
-              <a:t>Both models perform worse generally on less traditionally ‘colorable’ concepts like comfort, driving, and working. Though also perform worse on ‘mushroom’ which appears to show some high variability based on prompt style. </a:t>
+              <a:rPr lang="en-US" sz="5400" dirty="0"/>
+              <a:t>Performance across concepts</a:t>
             </a:r>
           </a:p>
         </p:txBody>
@@ -14079,15 +14631,14 @@
           <p:nvPr/>
         </p:nvPicPr>
         <p:blipFill>
-          <a:blip r:embed="rId3"/>
-          <a:stretch>
-            <a:fillRect/>
-          </a:stretch>
+          <a:blip r:embed="rId4"/>
+          <a:srcRect t="50000"/>
+          <a:stretch/>
         </p:blipFill>
         <p:spPr>
           <a:xfrm>
-            <a:off x="131772" y="0"/>
-            <a:ext cx="6877483" cy="6858000"/>
+            <a:off x="1832754" y="1303416"/>
+            <a:ext cx="8526491" cy="4251168"/>
           </a:xfrm>
           <a:prstGeom prst="rect">
             <a:avLst/>
@@ -14110,8 +14661,8 @@
         </p:nvSpPr>
         <p:spPr>
           <a:xfrm>
-            <a:off x="7605485" y="2023272"/>
-            <a:ext cx="4103911" cy="2114775"/>
+            <a:off x="719880" y="5796069"/>
+            <a:ext cx="3099193" cy="971388"/>
           </a:xfrm>
           <a:prstGeom prst="rect">
             <a:avLst/>
@@ -14295,26 +14846,6 @@
               <a:t>Prompt 1: The color of the image represents the word &lt;concept&gt;</a:t>
             </a:r>
           </a:p>
-          <a:p>
-            <a:pPr marL="0" indent="0">
-              <a:buFont typeface="Arial" panose="020B0604020202020204" pitchFamily="34" charset="0"/>
-              <a:buNone/>
-            </a:pPr>
-            <a:r>
-              <a:rPr lang="en-US" sz="1800" dirty="0"/>
-              <a:t>Prompt 2:  The concept &lt;concept&gt; is well represented by the color of the image.</a:t>
-            </a:r>
-          </a:p>
-          <a:p>
-            <a:pPr marL="0" indent="0">
-              <a:buFont typeface="Arial" panose="020B0604020202020204" pitchFamily="34" charset="0"/>
-              <a:buNone/>
-            </a:pPr>
-            <a:r>
-              <a:rPr lang="en-US" sz="1800" dirty="0"/>
-              <a:t>Prompt 3: The color of the image is associated with the concept &lt;concept&gt;</a:t>
-            </a:r>
-          </a:p>
         </p:txBody>
       </p:sp>
       <p:sp>
@@ -14331,7 +14862,7 @@
         </p:nvSpPr>
         <p:spPr>
           <a:xfrm>
-            <a:off x="7322555" y="2107180"/>
+            <a:off x="288417" y="6125369"/>
             <a:ext cx="275772" cy="275772"/>
           </a:xfrm>
           <a:prstGeom prst="ellipse">
@@ -14383,7 +14914,7 @@
         </p:nvSpPr>
         <p:spPr>
           <a:xfrm>
-            <a:off x="7322555" y="2721204"/>
+            <a:off x="4085063" y="6125369"/>
             <a:ext cx="275772" cy="275772"/>
           </a:xfrm>
           <a:prstGeom prst="ellipse">
@@ -14435,7 +14966,7 @@
         </p:nvSpPr>
         <p:spPr>
           <a:xfrm>
-            <a:off x="7322555" y="3543302"/>
+            <a:off x="8311131" y="6125369"/>
             <a:ext cx="275772" cy="275772"/>
           </a:xfrm>
           <a:prstGeom prst="ellipse">
@@ -14475,10 +15006,213 @@
       </p:sp>
       <p:sp>
         <p:nvSpPr>
-          <p:cNvPr id="25" name="TextBox 24">
-            <a:extLst>
-              <a:ext uri="{FF2B5EF4-FFF2-40B4-BE49-F238E27FC236}">
-                <a16:creationId xmlns:a16="http://schemas.microsoft.com/office/drawing/2014/main" id="{B7AA7100-14E6-0D49-8341-92B1F4E545E9}"/>
+          <p:cNvPr id="3" name="Content Placeholder 12">
+            <a:extLst>
+              <a:ext uri="{FF2B5EF4-FFF2-40B4-BE49-F238E27FC236}">
+                <a16:creationId xmlns:a16="http://schemas.microsoft.com/office/drawing/2014/main" id="{3DE58AF3-9BA9-36E8-5731-12EB0627F605}"/>
+              </a:ext>
+            </a:extLst>
+          </p:cNvPr>
+          <p:cNvSpPr txBox="1">
+            <a:spLocks/>
+          </p:cNvSpPr>
+          <p:nvPr/>
+        </p:nvSpPr>
+        <p:spPr>
+          <a:xfrm>
+            <a:off x="4600817" y="5796068"/>
+            <a:ext cx="3204342" cy="1210146"/>
+          </a:xfrm>
+          <a:prstGeom prst="rect">
+            <a:avLst/>
+          </a:prstGeom>
+        </p:spPr>
+        <p:txBody>
+          <a:bodyPr vert="horz" lIns="91440" tIns="45720" rIns="91440" bIns="45720" rtlCol="0">
+            <a:normAutofit/>
+          </a:bodyPr>
+          <a:lstStyle>
+            <a:lvl1pPr marL="228600" indent="-228600" algn="l" defTabSz="914400" rtl="0" eaLnBrk="1" latinLnBrk="0" hangingPunct="1">
+              <a:lnSpc>
+                <a:spcPct val="90000"/>
+              </a:lnSpc>
+              <a:spcBef>
+                <a:spcPts val="1000"/>
+              </a:spcBef>
+              <a:buFont typeface="Arial" panose="020B0604020202020204" pitchFamily="34" charset="0"/>
+              <a:buChar char="•"/>
+              <a:defRPr sz="2800" kern="1200">
+                <a:solidFill>
+                  <a:schemeClr val="tx1"/>
+                </a:solidFill>
+                <a:latin typeface="+mn-lt"/>
+                <a:ea typeface="+mn-ea"/>
+                <a:cs typeface="+mn-cs"/>
+              </a:defRPr>
+            </a:lvl1pPr>
+            <a:lvl2pPr marL="685800" indent="-228600" algn="l" defTabSz="914400" rtl="0" eaLnBrk="1" latinLnBrk="0" hangingPunct="1">
+              <a:lnSpc>
+                <a:spcPct val="90000"/>
+              </a:lnSpc>
+              <a:spcBef>
+                <a:spcPts val="500"/>
+              </a:spcBef>
+              <a:buFont typeface="Arial" panose="020B0604020202020204" pitchFamily="34" charset="0"/>
+              <a:buChar char="•"/>
+              <a:defRPr sz="2400" kern="1200">
+                <a:solidFill>
+                  <a:schemeClr val="tx1"/>
+                </a:solidFill>
+                <a:latin typeface="+mn-lt"/>
+                <a:ea typeface="+mn-ea"/>
+                <a:cs typeface="+mn-cs"/>
+              </a:defRPr>
+            </a:lvl2pPr>
+            <a:lvl3pPr marL="1143000" indent="-228600" algn="l" defTabSz="914400" rtl="0" eaLnBrk="1" latinLnBrk="0" hangingPunct="1">
+              <a:lnSpc>
+                <a:spcPct val="90000"/>
+              </a:lnSpc>
+              <a:spcBef>
+                <a:spcPts val="500"/>
+              </a:spcBef>
+              <a:buFont typeface="Arial" panose="020B0604020202020204" pitchFamily="34" charset="0"/>
+              <a:buChar char="•"/>
+              <a:defRPr sz="2000" kern="1200">
+                <a:solidFill>
+                  <a:schemeClr val="tx1"/>
+                </a:solidFill>
+                <a:latin typeface="+mn-lt"/>
+                <a:ea typeface="+mn-ea"/>
+                <a:cs typeface="+mn-cs"/>
+              </a:defRPr>
+            </a:lvl3pPr>
+            <a:lvl4pPr marL="1600200" indent="-228600" algn="l" defTabSz="914400" rtl="0" eaLnBrk="1" latinLnBrk="0" hangingPunct="1">
+              <a:lnSpc>
+                <a:spcPct val="90000"/>
+              </a:lnSpc>
+              <a:spcBef>
+                <a:spcPts val="500"/>
+              </a:spcBef>
+              <a:buFont typeface="Arial" panose="020B0604020202020204" pitchFamily="34" charset="0"/>
+              <a:buChar char="•"/>
+              <a:defRPr sz="1800" kern="1200">
+                <a:solidFill>
+                  <a:schemeClr val="tx1"/>
+                </a:solidFill>
+                <a:latin typeface="+mn-lt"/>
+                <a:ea typeface="+mn-ea"/>
+                <a:cs typeface="+mn-cs"/>
+              </a:defRPr>
+            </a:lvl4pPr>
+            <a:lvl5pPr marL="2057400" indent="-228600" algn="l" defTabSz="914400" rtl="0" eaLnBrk="1" latinLnBrk="0" hangingPunct="1">
+              <a:lnSpc>
+                <a:spcPct val="90000"/>
+              </a:lnSpc>
+              <a:spcBef>
+                <a:spcPts val="500"/>
+              </a:spcBef>
+              <a:buFont typeface="Arial" panose="020B0604020202020204" pitchFamily="34" charset="0"/>
+              <a:buChar char="•"/>
+              <a:defRPr sz="1800" kern="1200">
+                <a:solidFill>
+                  <a:schemeClr val="tx1"/>
+                </a:solidFill>
+                <a:latin typeface="+mn-lt"/>
+                <a:ea typeface="+mn-ea"/>
+                <a:cs typeface="+mn-cs"/>
+              </a:defRPr>
+            </a:lvl5pPr>
+            <a:lvl6pPr marL="2514600" indent="-228600" algn="l" defTabSz="914400" rtl="0" eaLnBrk="1" latinLnBrk="0" hangingPunct="1">
+              <a:lnSpc>
+                <a:spcPct val="90000"/>
+              </a:lnSpc>
+              <a:spcBef>
+                <a:spcPts val="500"/>
+              </a:spcBef>
+              <a:buFont typeface="Arial" panose="020B0604020202020204" pitchFamily="34" charset="0"/>
+              <a:buChar char="•"/>
+              <a:defRPr sz="1800" kern="1200">
+                <a:solidFill>
+                  <a:schemeClr val="tx1"/>
+                </a:solidFill>
+                <a:latin typeface="+mn-lt"/>
+                <a:ea typeface="+mn-ea"/>
+                <a:cs typeface="+mn-cs"/>
+              </a:defRPr>
+            </a:lvl6pPr>
+            <a:lvl7pPr marL="2971800" indent="-228600" algn="l" defTabSz="914400" rtl="0" eaLnBrk="1" latinLnBrk="0" hangingPunct="1">
+              <a:lnSpc>
+                <a:spcPct val="90000"/>
+              </a:lnSpc>
+              <a:spcBef>
+                <a:spcPts val="500"/>
+              </a:spcBef>
+              <a:buFont typeface="Arial" panose="020B0604020202020204" pitchFamily="34" charset="0"/>
+              <a:buChar char="•"/>
+              <a:defRPr sz="1800" kern="1200">
+                <a:solidFill>
+                  <a:schemeClr val="tx1"/>
+                </a:solidFill>
+                <a:latin typeface="+mn-lt"/>
+                <a:ea typeface="+mn-ea"/>
+                <a:cs typeface="+mn-cs"/>
+              </a:defRPr>
+            </a:lvl7pPr>
+            <a:lvl8pPr marL="3429000" indent="-228600" algn="l" defTabSz="914400" rtl="0" eaLnBrk="1" latinLnBrk="0" hangingPunct="1">
+              <a:lnSpc>
+                <a:spcPct val="90000"/>
+              </a:lnSpc>
+              <a:spcBef>
+                <a:spcPts val="500"/>
+              </a:spcBef>
+              <a:buFont typeface="Arial" panose="020B0604020202020204" pitchFamily="34" charset="0"/>
+              <a:buChar char="•"/>
+              <a:defRPr sz="1800" kern="1200">
+                <a:solidFill>
+                  <a:schemeClr val="tx1"/>
+                </a:solidFill>
+                <a:latin typeface="+mn-lt"/>
+                <a:ea typeface="+mn-ea"/>
+                <a:cs typeface="+mn-cs"/>
+              </a:defRPr>
+            </a:lvl8pPr>
+            <a:lvl9pPr marL="3886200" indent="-228600" algn="l" defTabSz="914400" rtl="0" eaLnBrk="1" latinLnBrk="0" hangingPunct="1">
+              <a:lnSpc>
+                <a:spcPct val="90000"/>
+              </a:lnSpc>
+              <a:spcBef>
+                <a:spcPts val="500"/>
+              </a:spcBef>
+              <a:buFont typeface="Arial" panose="020B0604020202020204" pitchFamily="34" charset="0"/>
+              <a:buChar char="•"/>
+              <a:defRPr sz="1800" kern="1200">
+                <a:solidFill>
+                  <a:schemeClr val="tx1"/>
+                </a:solidFill>
+                <a:latin typeface="+mn-lt"/>
+                <a:ea typeface="+mn-ea"/>
+                <a:cs typeface="+mn-cs"/>
+              </a:defRPr>
+            </a:lvl9pPr>
+          </a:lstStyle>
+          <a:p>
+            <a:pPr marL="0" indent="0">
+              <a:buFont typeface="Arial" panose="020B0604020202020204" pitchFamily="34" charset="0"/>
+              <a:buNone/>
+            </a:pPr>
+            <a:r>
+              <a:rPr lang="en-US" sz="1800" dirty="0"/>
+              <a:t>Prompt 2:  The concept &lt;concept&gt; is well represented by the color of the image.</a:t>
+            </a:r>
+          </a:p>
+        </p:txBody>
+      </p:sp>
+      <p:sp>
+        <p:nvSpPr>
+          <p:cNvPr id="5" name="TextBox 4">
+            <a:extLst>
+              <a:ext uri="{FF2B5EF4-FFF2-40B4-BE49-F238E27FC236}">
+                <a16:creationId xmlns:a16="http://schemas.microsoft.com/office/drawing/2014/main" id="{5BB09E86-90ED-174E-0DAB-358F9FDB0B6F}"/>
               </a:ext>
             </a:extLst>
           </p:cNvPr>
@@ -14487,8 +15221,8 @@
         </p:nvSpPr>
         <p:spPr>
           <a:xfrm>
-            <a:off x="7155543" y="4543176"/>
-            <a:ext cx="4553853" cy="1323439"/>
+            <a:off x="8699241" y="5796068"/>
+            <a:ext cx="3204342" cy="923330"/>
           </a:xfrm>
           <a:prstGeom prst="rect">
             <a:avLst/>
@@ -14502,70 +15236,13 @@
           <a:lstStyle/>
           <a:p>
             <a:pPr marL="0" indent="0">
+              <a:buFont typeface="Arial" panose="020B0604020202020204" pitchFamily="34" charset="0"/>
               <a:buNone/>
             </a:pPr>
             <a:r>
               <a:rPr lang="en-US" sz="1800" dirty="0"/>
-              <a:t>Prompt 1 had the highest PCC on average for both models.</a:t>
-            </a:r>
-          </a:p>
-          <a:p>
-            <a:pPr marL="0" indent="0">
-              <a:buNone/>
-            </a:pPr>
-            <a:r>
-              <a:rPr lang="en-US" sz="1800" dirty="0"/>
-              <a:t> </a:t>
-            </a:r>
-            <a:r>
-              <a:rPr lang="en-US" sz="2200" b="1" dirty="0">
-                <a:latin typeface="+mj-lt"/>
-              </a:rPr>
-              <a:t>0.273 </a:t>
-            </a:r>
-            <a:r>
-              <a:rPr lang="en-US" sz="2200" dirty="0">
-                <a:latin typeface="+mj-lt"/>
-              </a:rPr>
-              <a:t>for CLIP </a:t>
-            </a:r>
-            <a:r>
-              <a:rPr lang="en-US" sz="2200" dirty="0" err="1">
-                <a:latin typeface="+mj-lt"/>
-              </a:rPr>
-              <a:t>ViT</a:t>
-            </a:r>
-            <a:r>
-              <a:rPr lang="en-US" sz="2200" dirty="0">
-                <a:latin typeface="+mj-lt"/>
-              </a:rPr>
-              <a:t> 32 </a:t>
-            </a:r>
-            <a:endParaRPr lang="en-US" sz="1800" dirty="0"/>
-          </a:p>
-          <a:p>
-            <a:pPr marL="0" indent="0">
-              <a:buNone/>
-            </a:pPr>
-            <a:r>
-              <a:rPr lang="en-US" sz="1800" dirty="0"/>
-              <a:t> </a:t>
-            </a:r>
-            <a:r>
-              <a:rPr lang="en-US" sz="2200" b="1" dirty="0">
-                <a:latin typeface="+mj-lt"/>
-              </a:rPr>
-              <a:t>0.266 </a:t>
-            </a:r>
-            <a:r>
-              <a:rPr lang="en-US" sz="2200" dirty="0">
-                <a:latin typeface="+mj-lt"/>
-              </a:rPr>
-              <a:t>for Microsoft LL2CLIP</a:t>
-            </a:r>
-            <a:endParaRPr lang="en-US" sz="1800" dirty="0">
-              <a:latin typeface="+mj-lt"/>
-            </a:endParaRPr>
+              <a:t>Prompt 3: The color of the image is associated with the concept &lt;concept&gt;</a:t>
+            </a:r>
           </a:p>
         </p:txBody>
       </p:sp>
@@ -14579,116 +15256,11 @@
   <p:clrMapOvr>
     <a:masterClrMapping/>
   </p:clrMapOvr>
-  <p:timing>
-    <p:tnLst>
-      <p:par>
-        <p:cTn id="1" dur="indefinite" restart="never" nodeType="tmRoot">
-          <p:childTnLst>
-            <p:seq concurrent="1" nextAc="seek">
-              <p:cTn id="2" dur="indefinite" nodeType="mainSeq">
-                <p:childTnLst>
-                  <p:par>
-                    <p:cTn id="3" fill="hold">
-                      <p:stCondLst>
-                        <p:cond delay="indefinite"/>
-                      </p:stCondLst>
-                      <p:childTnLst>
-                        <p:par>
-                          <p:cTn id="4" fill="hold">
-                            <p:stCondLst>
-                              <p:cond delay="0"/>
-                            </p:stCondLst>
-                            <p:childTnLst>
-                              <p:par>
-                                <p:cTn id="5" presetID="1" presetClass="exit" presetSubtype="0" fill="hold" grpId="0" nodeType="clickEffect">
-                                  <p:stCondLst>
-                                    <p:cond delay="0"/>
-                                  </p:stCondLst>
-                                  <p:childTnLst>
-                                    <p:set>
-                                      <p:cBhvr>
-                                        <p:cTn id="6" dur="1" fill="hold">
-                                          <p:stCondLst>
-                                            <p:cond delay="0"/>
-                                          </p:stCondLst>
-                                        </p:cTn>
-                                        <p:tgtEl>
-                                          <p:spTgt spid="25"/>
-                                        </p:tgtEl>
-                                        <p:attrNameLst>
-                                          <p:attrName>style.visibility</p:attrName>
-                                        </p:attrNameLst>
-                                      </p:cBhvr>
-                                      <p:to>
-                                        <p:strVal val="hidden"/>
-                                      </p:to>
-                                    </p:set>
-                                  </p:childTnLst>
-                                </p:cTn>
-                              </p:par>
-                              <p:par>
-                                <p:cTn id="7" presetID="1" presetClass="entr" presetSubtype="0" fill="hold" grpId="0" nodeType="withEffect">
-                                  <p:stCondLst>
-                                    <p:cond delay="0"/>
-                                  </p:stCondLst>
-                                  <p:childTnLst>
-                                    <p:set>
-                                      <p:cBhvr>
-                                        <p:cTn id="8" dur="1" fill="hold">
-                                          <p:stCondLst>
-                                            <p:cond delay="0"/>
-                                          </p:stCondLst>
-                                        </p:cTn>
-                                        <p:tgtEl>
-                                          <p:spTgt spid="20">
-                                            <p:txEl>
-                                              <p:pRg st="0" end="0"/>
-                                            </p:txEl>
-                                          </p:spTgt>
-                                        </p:tgtEl>
-                                        <p:attrNameLst>
-                                          <p:attrName>style.visibility</p:attrName>
-                                        </p:attrNameLst>
-                                      </p:cBhvr>
-                                      <p:to>
-                                        <p:strVal val="visible"/>
-                                      </p:to>
-                                    </p:set>
-                                  </p:childTnLst>
-                                </p:cTn>
-                              </p:par>
-                            </p:childTnLst>
-                          </p:cTn>
-                        </p:par>
-                      </p:childTnLst>
-                    </p:cTn>
-                  </p:par>
-                </p:childTnLst>
-              </p:cTn>
-              <p:prevCondLst>
-                <p:cond evt="onPrev" delay="0">
-                  <p:tgtEl>
-                    <p:sldTgt/>
-                  </p:tgtEl>
-                </p:cond>
-              </p:prevCondLst>
-              <p:nextCondLst>
-                <p:cond evt="onNext" delay="0">
-                  <p:tgtEl>
-                    <p:sldTgt/>
-                  </p:tgtEl>
-                </p:cond>
-              </p:nextCondLst>
-            </p:seq>
-          </p:childTnLst>
-        </p:cTn>
-      </p:par>
-    </p:tnLst>
-    <p:bldLst>
-      <p:bldP spid="20" grpId="0" build="p"/>
-      <p:bldP spid="25" grpId="0"/>
-    </p:bldLst>
-  </p:timing>
+  <p:extLst>
+    <p:ext uri="{6950BFC3-D8DA-4A85-94F7-54DA5524770B}">
+      <p188:commentRel xmlns:p188="http://schemas.microsoft.com/office/powerpoint/2018/8/main" r:id="rId3"/>
+    </p:ext>
+  </p:extLst>
 </p:sld>
 </file>
 
@@ -15046,17 +15618,14 @@
               <a:buNone/>
             </a:pPr>
             <a:r>
-              <a:rPr lang="en-US" sz="2000"/>
-              <a:t>Humans associate meanings with colors based on their sensory experiences, we will refer to this as </a:t>
-            </a:r>
-            <a:r>
-              <a:rPr lang="en-US" sz="2000" b="1"/>
-              <a:t>color-concept associations</a:t>
-            </a:r>
-            <a:r>
-              <a:rPr lang="en-US" sz="2000"/>
-              <a:t>. </a:t>
-            </a:r>
+              <a:rPr lang="en-US" sz="2000" dirty="0"/>
+              <a:t>Humans associate meanings with colors based on their sensory experiences, leading to </a:t>
+            </a:r>
+            <a:r>
+              <a:rPr lang="en-US" sz="2000" b="1" dirty="0"/>
+              <a:t>color-concept associations.</a:t>
+            </a:r>
+            <a:endParaRPr lang="en-US" sz="2000" dirty="0"/>
           </a:p>
         </p:txBody>
       </p:sp>
@@ -15149,7 +15718,7 @@
 </file>
 
 <file path=ppt/slides/slide20.xml><?xml version="1.0" encoding="utf-8"?>
-<p:sld xmlns:a="http://schemas.openxmlformats.org/drawingml/2006/main" xmlns:r="http://schemas.openxmlformats.org/officeDocument/2006/relationships" xmlns:p="http://schemas.openxmlformats.org/presentationml/2006/main">
+<p:sld xmlns:a="http://schemas.openxmlformats.org/drawingml/2006/main" xmlns:r="http://schemas.openxmlformats.org/officeDocument/2006/relationships" xmlns:p="http://schemas.openxmlformats.org/presentationml/2006/main" show="0">
   <p:cSld>
     <p:spTree>
       <p:nvGrpSpPr>
@@ -15360,13 +15929,13 @@
         </p:nvSpPr>
         <p:spPr>
           <a:xfrm>
-            <a:off x="630936" y="639520"/>
-            <a:ext cx="3429000" cy="1719072"/>
+            <a:off x="3280339" y="178291"/>
+            <a:ext cx="5631319" cy="1042416"/>
           </a:xfrm>
         </p:spPr>
         <p:txBody>
           <a:bodyPr anchor="b">
-            <a:normAutofit fontScale="90000"/>
+            <a:normAutofit/>
           </a:bodyPr>
           <a:lstStyle/>
           <a:p>
@@ -15650,52 +16219,6 @@
           </a:p>
         </p:txBody>
       </p:sp>
-      <p:sp>
-        <p:nvSpPr>
-          <p:cNvPr id="9" name="Content Placeholder 8">
-            <a:extLst>
-              <a:ext uri="{FF2B5EF4-FFF2-40B4-BE49-F238E27FC236}">
-                <a16:creationId xmlns:a16="http://schemas.microsoft.com/office/drawing/2014/main" id="{F0357883-FF45-4BCB-69D6-F8B1BB058996}"/>
-              </a:ext>
-            </a:extLst>
-          </p:cNvPr>
-          <p:cNvSpPr>
-            <a:spLocks noGrp="1"/>
-          </p:cNvSpPr>
-          <p:nvPr>
-            <p:ph idx="1"/>
-          </p:nvPr>
-        </p:nvSpPr>
-        <p:spPr>
-          <a:xfrm>
-            <a:off x="630936" y="2807208"/>
-            <a:ext cx="3429000" cy="3410712"/>
-          </a:xfrm>
-        </p:spPr>
-        <p:txBody>
-          <a:bodyPr anchor="t">
-            <a:normAutofit/>
-          </a:bodyPr>
-          <a:lstStyle/>
-          <a:p>
-            <a:pPr marL="0" indent="0">
-              <a:buNone/>
-            </a:pPr>
-            <a:r>
-              <a:rPr lang="en-US" sz="2200" dirty="0"/>
-              <a:t>Microsoft’s LLM2CLIP model outperformed the </a:t>
-            </a:r>
-            <a:r>
-              <a:rPr lang="en-US" sz="2200" dirty="0" err="1"/>
-              <a:t>ViT</a:t>
-            </a:r>
-            <a:r>
-              <a:rPr lang="en-US" sz="2200" dirty="0"/>
-              <a:t> B 32 Model on 12 out of the 20 concepts based on PCC</a:t>
-            </a:r>
-          </a:p>
-        </p:txBody>
-      </p:sp>
       <p:pic>
         <p:nvPicPr>
           <p:cNvPr id="5" name="Content Placeholder 4">
@@ -15718,58 +16241,19 @@
               </a:ext>
             </a:extLst>
           </a:blip>
-          <a:stretch>
-            <a:fillRect/>
-          </a:stretch>
+          <a:srcRect t="4816"/>
+          <a:stretch/>
         </p:blipFill>
         <p:spPr>
           <a:xfrm>
-            <a:off x="4457557" y="626251"/>
-            <a:ext cx="7349018" cy="4409411"/>
+            <a:off x="1196354" y="1282019"/>
+            <a:ext cx="9799287" cy="5596418"/>
           </a:xfrm>
           <a:prstGeom prst="rect">
             <a:avLst/>
           </a:prstGeom>
         </p:spPr>
       </p:pic>
-      <p:sp>
-        <p:nvSpPr>
-          <p:cNvPr id="6" name="TextBox 5">
-            <a:extLst>
-              <a:ext uri="{FF2B5EF4-FFF2-40B4-BE49-F238E27FC236}">
-                <a16:creationId xmlns:a16="http://schemas.microsoft.com/office/drawing/2014/main" id="{47FE3A30-E2F7-DB02-072A-EF09FDE163C9}"/>
-              </a:ext>
-            </a:extLst>
-          </p:cNvPr>
-          <p:cNvSpPr txBox="1"/>
-          <p:nvPr/>
-        </p:nvSpPr>
-        <p:spPr>
-          <a:xfrm>
-            <a:off x="8750521" y="5262204"/>
-            <a:ext cx="3056054" cy="1200329"/>
-          </a:xfrm>
-          <a:prstGeom prst="rect">
-            <a:avLst/>
-          </a:prstGeom>
-          <a:noFill/>
-        </p:spPr>
-        <p:txBody>
-          <a:bodyPr wrap="square" rtlCol="0">
-            <a:spAutoFit/>
-          </a:bodyPr>
-          <a:lstStyle/>
-          <a:p>
-            <a:pPr algn="r"/>
-            <a:r>
-              <a:rPr lang="en-US" dirty="0">
-                <a:latin typeface="Oswald ExtraLight" pitchFamily="2" charset="77"/>
-              </a:rPr>
-              <a:t>Concepts are ordered by descending absolute difference between the PCC values for the different models </a:t>
-            </a:r>
-          </a:p>
-        </p:txBody>
-      </p:sp>
     </p:spTree>
     <p:extLst>
       <p:ext uri="{BB962C8B-B14F-4D97-AF65-F5344CB8AC3E}">
@@ -15837,46 +16321,8 @@
           <a:lstStyle/>
           <a:p>
             <a:r>
-              <a:rPr lang="en-US" sz="3600"/>
-              <a:t>How does it hold up to related literature?</a:t>
-            </a:r>
-          </a:p>
-        </p:txBody>
-      </p:sp>
-      <p:sp>
-        <p:nvSpPr>
-          <p:cNvPr id="3" name="Content Placeholder 2">
-            <a:extLst>
-              <a:ext uri="{FF2B5EF4-FFF2-40B4-BE49-F238E27FC236}">
-                <a16:creationId xmlns:a16="http://schemas.microsoft.com/office/drawing/2014/main" id="{8DCCA4AE-9DDA-89D3-E6EC-F3CB34AF5DF2}"/>
-              </a:ext>
-            </a:extLst>
-          </p:cNvPr>
-          <p:cNvSpPr>
-            <a:spLocks noGrp="1"/>
-          </p:cNvSpPr>
-          <p:nvPr>
-            <p:ph idx="1"/>
-          </p:nvPr>
-        </p:nvSpPr>
-        <p:spPr>
-          <a:xfrm>
-            <a:off x="762001" y="5672059"/>
-            <a:ext cx="10109199" cy="547765"/>
-          </a:xfrm>
-        </p:spPr>
-        <p:txBody>
-          <a:bodyPr vert="horz" lIns="91440" tIns="45720" rIns="91440" bIns="45720" rtlCol="0" anchor="t">
-            <a:normAutofit fontScale="92500"/>
-          </a:bodyPr>
-          <a:lstStyle/>
-          <a:p>
-            <a:pPr marL="0" indent="0">
-              <a:buNone/>
-            </a:pPr>
-            <a:r>
-              <a:rPr lang="en-US" sz="1500" dirty="0"/>
-              <a:t>Results in the table show the Pearson Correlation Coefficients between predicted associations and ground truth ratings, compared across different techniques: Colorization from Hu et al., GPT-4 from Mukherjee, and results from 2 of our experiments.</a:t>
+              <a:rPr lang="en-US" sz="3600" dirty="0"/>
+              <a:t>Comparison with previous methods</a:t>
             </a:r>
           </a:p>
         </p:txBody>
@@ -15896,13 +16342,13 @@
           <p:nvPr/>
         </p:nvPicPr>
         <p:blipFill>
-          <a:blip r:embed="rId2"/>
+          <a:blip r:embed="rId3"/>
           <a:srcRect t="21548" b="21410"/>
           <a:stretch/>
         </p:blipFill>
         <p:spPr>
           <a:xfrm>
-            <a:off x="20" y="-39"/>
+            <a:off x="0" y="376271"/>
             <a:ext cx="12191980" cy="4172740"/>
           </a:xfrm>
           <a:prstGeom prst="rect">
@@ -15977,7 +16423,7 @@
           <p:nvPr/>
         </p:nvPicPr>
         <p:blipFill>
-          <a:blip r:embed="rId3"/>
+          <a:blip r:embed="rId4"/>
           <a:stretch>
             <a:fillRect/>
           </a:stretch>
@@ -16002,6 +16448,11 @@
   <p:clrMapOvr>
     <a:masterClrMapping/>
   </p:clrMapOvr>
+  <p:extLst>
+    <p:ext uri="{6950BFC3-D8DA-4A85-94F7-54DA5524770B}">
+      <p188:commentRel xmlns:p188="http://schemas.microsoft.com/office/powerpoint/2018/8/main" r:id="rId2"/>
+    </p:ext>
+  </p:extLst>
 </p:sld>
 </file>
 
@@ -16045,7 +16496,7 @@
           <a:p>
             <a:r>
               <a:rPr lang="en-US" dirty="0"/>
-              <a:t>What’s Next </a:t>
+              <a:t>Next steps</a:t>
             </a:r>
           </a:p>
         </p:txBody>
@@ -16095,6 +16546,11 @@
   <p:clrMapOvr>
     <a:masterClrMapping/>
   </p:clrMapOvr>
+  <p:extLst>
+    <p:ext uri="{6950BFC3-D8DA-4A85-94F7-54DA5524770B}">
+      <p188:commentRel xmlns:p188="http://schemas.microsoft.com/office/powerpoint/2018/8/main" r:id="rId2"/>
+    </p:ext>
+  </p:extLst>
 </p:sld>
 </file>
 
@@ -16327,7 +16783,7 @@
 </file>
 
 <file path=ppt/slides/slide25.xml><?xml version="1.0" encoding="utf-8"?>
-<p:sld xmlns:a="http://schemas.openxmlformats.org/drawingml/2006/main" xmlns:r="http://schemas.openxmlformats.org/officeDocument/2006/relationships" xmlns:p="http://schemas.openxmlformats.org/presentationml/2006/main">
+<p:sld xmlns:a="http://schemas.openxmlformats.org/drawingml/2006/main" xmlns:r="http://schemas.openxmlformats.org/officeDocument/2006/relationships" xmlns:p="http://schemas.openxmlformats.org/presentationml/2006/main" show="0">
   <p:cSld>
     <p:spTree>
       <p:nvGrpSpPr>
@@ -16409,6 +16865,11 @@
   <p:clrMapOvr>
     <a:masterClrMapping/>
   </p:clrMapOvr>
+  <p:extLst>
+    <p:ext uri="{6950BFC3-D8DA-4A85-94F7-54DA5524770B}">
+      <p188:commentRel xmlns:p188="http://schemas.microsoft.com/office/powerpoint/2018/8/main" r:id="rId2"/>
+    </p:ext>
+  </p:extLst>
 </p:sld>
 </file>
 
@@ -16596,44 +17057,6 @@
           </a:fontRef>
         </p:style>
       </p:cxnSp>
-      <p:sp>
-        <p:nvSpPr>
-          <p:cNvPr id="3" name="Content Placeholder 2">
-            <a:extLst>
-              <a:ext uri="{FF2B5EF4-FFF2-40B4-BE49-F238E27FC236}">
-                <a16:creationId xmlns:a16="http://schemas.microsoft.com/office/drawing/2014/main" id="{A13C12C9-DFAB-F2E7-0078-AD297EC03ADA}"/>
-              </a:ext>
-            </a:extLst>
-          </p:cNvPr>
-          <p:cNvSpPr>
-            <a:spLocks noGrp="1"/>
-          </p:cNvSpPr>
-          <p:nvPr>
-            <p:ph idx="1"/>
-          </p:nvPr>
-        </p:nvSpPr>
-        <p:spPr>
-          <a:xfrm>
-            <a:off x="7384131" y="2746565"/>
-            <a:ext cx="4087492" cy="824181"/>
-          </a:xfrm>
-        </p:spPr>
-        <p:txBody>
-          <a:bodyPr>
-            <a:normAutofit/>
-          </a:bodyPr>
-          <a:lstStyle/>
-          <a:p>
-            <a:pPr marL="0" indent="0">
-              <a:buNone/>
-            </a:pPr>
-            <a:r>
-              <a:rPr lang="en-US" sz="2000" dirty="0"/>
-              <a:t>Underestimating people’s ability to infer meaning from color </a:t>
-            </a:r>
-          </a:p>
-        </p:txBody>
-      </p:sp>
       <p:pic>
         <p:nvPicPr>
           <p:cNvPr id="4" name="Picture 3">
@@ -16692,7 +17115,7 @@
         </p:blipFill>
         <p:spPr>
           <a:xfrm>
-            <a:off x="7775108" y="3428999"/>
+            <a:off x="7771470" y="2991677"/>
             <a:ext cx="591089" cy="591089"/>
           </a:xfrm>
           <a:prstGeom prst="rect">
@@ -16714,7 +17137,78 @@
         </p:nvSpPr>
         <p:spPr>
           <a:xfrm>
-            <a:off x="8454572" y="3478423"/>
+            <a:off x="8450934" y="3041101"/>
+            <a:ext cx="3017052" cy="646331"/>
+          </a:xfrm>
+          <a:prstGeom prst="rect">
+            <a:avLst/>
+          </a:prstGeom>
+          <a:noFill/>
+        </p:spPr>
+        <p:txBody>
+          <a:bodyPr wrap="square" rtlCol="0">
+            <a:spAutoFit/>
+          </a:bodyPr>
+          <a:lstStyle/>
+          <a:p>
+            <a:r>
+              <a:rPr lang="en-US" dirty="0"/>
+              <a:t>We can leverage color for visual communication</a:t>
+            </a:r>
+          </a:p>
+        </p:txBody>
+      </p:sp>
+      <p:pic>
+        <p:nvPicPr>
+          <p:cNvPr id="11" name="Graphic 10" descr="Arrow: Slight curve with solid fill">
+            <a:extLst>
+              <a:ext uri="{FF2B5EF4-FFF2-40B4-BE49-F238E27FC236}">
+                <a16:creationId xmlns:a16="http://schemas.microsoft.com/office/drawing/2014/main" id="{38F8151B-897E-35B1-FB72-276D1C449E9E}"/>
+              </a:ext>
+            </a:extLst>
+          </p:cNvPr>
+          <p:cNvPicPr>
+            <a:picLocks noChangeAspect="1"/>
+          </p:cNvPicPr>
+          <p:nvPr/>
+        </p:nvPicPr>
+        <p:blipFill>
+          <a:blip r:embed="rId4">
+            <a:extLst>
+              <a:ext uri="{96DAC541-7B7A-43D3-8B79-37D633B846F1}">
+                <asvg:svgBlip xmlns:asvg="http://schemas.microsoft.com/office/drawing/2016/SVG/main" r:embed="rId5"/>
+              </a:ext>
+            </a:extLst>
+          </a:blip>
+          <a:stretch>
+            <a:fillRect/>
+          </a:stretch>
+        </p:blipFill>
+        <p:spPr>
+          <a:xfrm>
+            <a:off x="7775107" y="4018090"/>
+            <a:ext cx="591089" cy="591089"/>
+          </a:xfrm>
+          <a:prstGeom prst="rect">
+            <a:avLst/>
+          </a:prstGeom>
+        </p:spPr>
+      </p:pic>
+      <p:sp>
+        <p:nvSpPr>
+          <p:cNvPr id="12" name="TextBox 11">
+            <a:extLst>
+              <a:ext uri="{FF2B5EF4-FFF2-40B4-BE49-F238E27FC236}">
+                <a16:creationId xmlns:a16="http://schemas.microsoft.com/office/drawing/2014/main" id="{8E18BEA2-94BA-92E9-B7F2-E7041607BA83}"/>
+              </a:ext>
+            </a:extLst>
+          </p:cNvPr>
+          <p:cNvSpPr txBox="1"/>
+          <p:nvPr/>
+        </p:nvSpPr>
+        <p:spPr>
+          <a:xfrm>
+            <a:off x="8454571" y="4067514"/>
             <a:ext cx="3017052" cy="923330"/>
           </a:xfrm>
           <a:prstGeom prst="rect">
@@ -16730,78 +17224,7 @@
           <a:p>
             <a:r>
               <a:rPr lang="en-US" dirty="0"/>
-              <a:t>Missed opportunities to leverage color for visual communication</a:t>
-            </a:r>
-          </a:p>
-        </p:txBody>
-      </p:sp>
-      <p:pic>
-        <p:nvPicPr>
-          <p:cNvPr id="11" name="Graphic 10" descr="Arrow: Slight curve with solid fill">
-            <a:extLst>
-              <a:ext uri="{FF2B5EF4-FFF2-40B4-BE49-F238E27FC236}">
-                <a16:creationId xmlns:a16="http://schemas.microsoft.com/office/drawing/2014/main" id="{38F8151B-897E-35B1-FB72-276D1C449E9E}"/>
-              </a:ext>
-            </a:extLst>
-          </p:cNvPr>
-          <p:cNvPicPr>
-            <a:picLocks noChangeAspect="1"/>
-          </p:cNvPicPr>
-          <p:nvPr/>
-        </p:nvPicPr>
-        <p:blipFill>
-          <a:blip r:embed="rId4">
-            <a:extLst>
-              <a:ext uri="{96DAC541-7B7A-43D3-8B79-37D633B846F1}">
-                <asvg:svgBlip xmlns:asvg="http://schemas.microsoft.com/office/drawing/2016/SVG/main" r:embed="rId5"/>
-              </a:ext>
-            </a:extLst>
-          </a:blip>
-          <a:stretch>
-            <a:fillRect/>
-          </a:stretch>
-        </p:blipFill>
-        <p:spPr>
-          <a:xfrm>
-            <a:off x="7778745" y="4455412"/>
-            <a:ext cx="591089" cy="591089"/>
-          </a:xfrm>
-          <a:prstGeom prst="rect">
-            <a:avLst/>
-          </a:prstGeom>
-        </p:spPr>
-      </p:pic>
-      <p:sp>
-        <p:nvSpPr>
-          <p:cNvPr id="12" name="TextBox 11">
-            <a:extLst>
-              <a:ext uri="{FF2B5EF4-FFF2-40B4-BE49-F238E27FC236}">
-                <a16:creationId xmlns:a16="http://schemas.microsoft.com/office/drawing/2014/main" id="{8E18BEA2-94BA-92E9-B7F2-E7041607BA83}"/>
-              </a:ext>
-            </a:extLst>
-          </p:cNvPr>
-          <p:cNvSpPr txBox="1"/>
-          <p:nvPr/>
-        </p:nvSpPr>
-        <p:spPr>
-          <a:xfrm>
-            <a:off x="8458209" y="4504836"/>
-            <a:ext cx="3017052" cy="923330"/>
-          </a:xfrm>
-          <a:prstGeom prst="rect">
-            <a:avLst/>
-          </a:prstGeom>
-          <a:noFill/>
-        </p:spPr>
-        <p:txBody>
-          <a:bodyPr wrap="square" rtlCol="0">
-            <a:spAutoFit/>
-          </a:bodyPr>
-          <a:lstStyle/>
-          <a:p>
-            <a:r>
-              <a:rPr lang="en-US" dirty="0"/>
-              <a:t>Misleading color encodings that impede effective communication </a:t>
+              <a:t>Misleading color encodings impede effective communication </a:t>
             </a:r>
           </a:p>
         </p:txBody>
@@ -16828,6 +17251,9 @@
                     <p:cTn id="3" fill="hold">
                       <p:stCondLst>
                         <p:cond delay="indefinite"/>
+                        <p:cond evt="onBegin" delay="0">
+                          <p:tn val="2"/>
+                        </p:cond>
                       </p:stCondLst>
                       <p:childTnLst>
                         <p:par>
@@ -16837,7 +17263,7 @@
                             </p:stCondLst>
                             <p:childTnLst>
                               <p:par>
-                                <p:cTn id="5" presetID="1" presetClass="entr" presetSubtype="0" fill="hold" grpId="0" nodeType="clickEffect">
+                                <p:cTn id="5" presetID="1" presetClass="entr" presetSubtype="0" fill="hold" nodeType="withEffect">
                                   <p:stCondLst>
                                     <p:cond delay="0"/>
                                   </p:stCondLst>
@@ -16845,37 +17271,6 @@
                                     <p:set>
                                       <p:cBhvr>
                                         <p:cTn id="6" dur="1" fill="hold">
-                                          <p:stCondLst>
-                                            <p:cond delay="0"/>
-                                          </p:stCondLst>
-                                        </p:cTn>
-                                        <p:tgtEl>
-                                          <p:spTgt spid="3">
-                                            <p:txEl>
-                                              <p:pRg st="0" end="0"/>
-                                            </p:txEl>
-                                          </p:spTgt>
-                                        </p:tgtEl>
-                                        <p:attrNameLst>
-                                          <p:attrName>style.visibility</p:attrName>
-                                        </p:attrNameLst>
-                                      </p:cBhvr>
-                                      <p:to>
-                                        <p:strVal val="visible"/>
-                                      </p:to>
-                                    </p:set>
-                                  </p:childTnLst>
-                                </p:cTn>
-                              </p:par>
-                              <p:par>
-                                <p:cTn id="7" presetID="1" presetClass="entr" presetSubtype="0" fill="hold" nodeType="withEffect">
-                                  <p:stCondLst>
-                                    <p:cond delay="0"/>
-                                  </p:stCondLst>
-                                  <p:childTnLst>
-                                    <p:set>
-                                      <p:cBhvr>
-                                        <p:cTn id="8" dur="1" fill="hold">
                                           <p:stCondLst>
                                             <p:cond delay="0"/>
                                           </p:stCondLst>
@@ -16895,14 +17290,14 @@
                                 </p:cTn>
                               </p:par>
                               <p:par>
-                                <p:cTn id="9" presetID="1" presetClass="entr" presetSubtype="0" fill="hold" grpId="0" nodeType="withEffect">
+                                <p:cTn id="7" presetID="1" presetClass="entr" presetSubtype="0" fill="hold" grpId="0" nodeType="withEffect">
                                   <p:stCondLst>
                                     <p:cond delay="0"/>
                                   </p:stCondLst>
                                   <p:childTnLst>
                                     <p:set>
                                       <p:cBhvr>
-                                        <p:cTn id="10" dur="1" fill="hold">
+                                        <p:cTn id="8" dur="1" fill="hold">
                                           <p:stCondLst>
                                             <p:cond delay="0"/>
                                           </p:stCondLst>
@@ -16922,14 +17317,14 @@
                                 </p:cTn>
                               </p:par>
                               <p:par>
-                                <p:cTn id="11" presetID="1" presetClass="entr" presetSubtype="0" fill="hold" nodeType="withEffect">
+                                <p:cTn id="9" presetID="1" presetClass="entr" presetSubtype="0" fill="hold" nodeType="withEffect">
                                   <p:stCondLst>
                                     <p:cond delay="0"/>
                                   </p:stCondLst>
                                   <p:childTnLst>
                                     <p:set>
                                       <p:cBhvr>
-                                        <p:cTn id="12" dur="1" fill="hold">
+                                        <p:cTn id="10" dur="1" fill="hold">
                                           <p:stCondLst>
                                             <p:cond delay="0"/>
                                           </p:stCondLst>
@@ -16949,14 +17344,14 @@
                                 </p:cTn>
                               </p:par>
                               <p:par>
-                                <p:cTn id="13" presetID="1" presetClass="entr" presetSubtype="0" fill="hold" grpId="0" nodeType="withEffect">
+                                <p:cTn id="11" presetID="1" presetClass="entr" presetSubtype="0" fill="hold" grpId="0" nodeType="withEffect">
                                   <p:stCondLst>
                                     <p:cond delay="0"/>
                                   </p:stCondLst>
                                   <p:childTnLst>
                                     <p:set>
                                       <p:cBhvr>
-                                        <p:cTn id="14" dur="1" fill="hold">
+                                        <p:cTn id="12" dur="1" fill="hold">
                                           <p:stCondLst>
                                             <p:cond delay="0"/>
                                           </p:stCondLst>
@@ -17003,7 +17398,6 @@
       </p:par>
     </p:tnLst>
     <p:bldLst>
-      <p:bldP spid="3" grpId="0" build="p"/>
       <p:bldP spid="8" grpId="0"/>
       <p:bldP spid="12" grpId="0"/>
     </p:bldLst>
@@ -17428,7 +17822,7 @@
           </p:nvPr>
         </p:nvPicPr>
         <p:blipFill>
-          <a:blip r:embed="rId3"/>
+          <a:blip r:embed="rId4"/>
           <a:stretch>
             <a:fillRect/>
           </a:stretch>
@@ -17453,6 +17847,11 @@
   <p:clrMapOvr>
     <a:masterClrMapping/>
   </p:clrMapOvr>
+  <p:extLst>
+    <p:ext uri="{6950BFC3-D8DA-4A85-94F7-54DA5524770B}">
+      <p188:commentRel xmlns:p188="http://schemas.microsoft.com/office/powerpoint/2018/8/main" r:id="rId3"/>
+    </p:ext>
+  </p:extLst>
 </p:sld>
 </file>
 
@@ -17578,7 +17977,7 @@
                 <a:ea typeface="+mj-ea"/>
                 <a:cs typeface="+mj-cs"/>
               </a:rPr>
-              <a:t>Literature</a:t>
+              <a:t>Previous Literature</a:t>
             </a:r>
           </a:p>
         </p:txBody>
@@ -18374,14 +18773,13 @@
         </p:nvPicPr>
         <p:blipFill>
           <a:blip r:embed="rId3"/>
-          <a:stretch>
-            <a:fillRect/>
-          </a:stretch>
+          <a:srcRect l="3213" r="3502" b="24984"/>
+          <a:stretch/>
         </p:blipFill>
         <p:spPr>
           <a:xfrm>
-            <a:off x="1512618" y="2290936"/>
-            <a:ext cx="9154572" cy="3959352"/>
+            <a:off x="101416" y="2356238"/>
+            <a:ext cx="11989168" cy="4169934"/>
           </a:xfrm>
           <a:prstGeom prst="rect">
             <a:avLst/>
@@ -18813,14 +19211,13 @@
         </p:nvPicPr>
         <p:blipFill>
           <a:blip r:embed="rId3"/>
-          <a:stretch>
-            <a:fillRect/>
-          </a:stretch>
+          <a:srcRect b="14545"/>
+          <a:stretch/>
         </p:blipFill>
         <p:spPr>
           <a:xfrm>
-            <a:off x="2278815" y="2390111"/>
-            <a:ext cx="7297058" cy="3995474"/>
+            <a:off x="1297764" y="2223715"/>
+            <a:ext cx="9596471" cy="4490251"/>
           </a:xfrm>
           <a:prstGeom prst="rect">
             <a:avLst/>
@@ -19277,10 +19674,10 @@
       </p:sp>
       <p:pic>
         <p:nvPicPr>
-          <p:cNvPr id="5" name="Picture 4">
-            <a:extLst>
-              <a:ext uri="{FF2B5EF4-FFF2-40B4-BE49-F238E27FC236}">
-                <a16:creationId xmlns:a16="http://schemas.microsoft.com/office/drawing/2014/main" id="{3C55089C-5B80-4389-EAAF-9AC119D5FB37}"/>
+          <p:cNvPr id="6" name="Picture 5">
+            <a:extLst>
+              <a:ext uri="{FF2B5EF4-FFF2-40B4-BE49-F238E27FC236}">
+                <a16:creationId xmlns:a16="http://schemas.microsoft.com/office/drawing/2014/main" id="{B15AE6CC-ABC6-E685-C16E-FD71E6A690E6}"/>
               </a:ext>
             </a:extLst>
           </p:cNvPr>
@@ -19291,44 +19688,13 @@
         </p:nvPicPr>
         <p:blipFill>
           <a:blip r:embed="rId3"/>
-          <a:stretch>
-            <a:fillRect/>
-          </a:stretch>
+          <a:srcRect b="17166"/>
+          <a:stretch/>
         </p:blipFill>
         <p:spPr>
           <a:xfrm>
-            <a:off x="5837441" y="3444241"/>
-            <a:ext cx="6349251" cy="2710711"/>
-          </a:xfrm>
-          <a:prstGeom prst="rect">
-            <a:avLst/>
-          </a:prstGeom>
-        </p:spPr>
-      </p:pic>
-      <p:pic>
-        <p:nvPicPr>
-          <p:cNvPr id="6" name="Picture 5">
-            <a:extLst>
-              <a:ext uri="{FF2B5EF4-FFF2-40B4-BE49-F238E27FC236}">
-                <a16:creationId xmlns:a16="http://schemas.microsoft.com/office/drawing/2014/main" id="{B15AE6CC-ABC6-E685-C16E-FD71E6A690E6}"/>
-              </a:ext>
-            </a:extLst>
-          </p:cNvPr>
-          <p:cNvPicPr>
-            <a:picLocks noChangeAspect="1"/>
-          </p:cNvPicPr>
-          <p:nvPr/>
-        </p:nvPicPr>
-        <p:blipFill>
-          <a:blip r:embed="rId4"/>
-          <a:stretch>
-            <a:fillRect/>
-          </a:stretch>
-        </p:blipFill>
-        <p:spPr>
-          <a:xfrm>
-            <a:off x="26728" y="2879745"/>
-            <a:ext cx="5666979" cy="3090260"/>
+            <a:off x="1283403" y="2279375"/>
+            <a:ext cx="9625193" cy="4347707"/>
           </a:xfrm>
           <a:prstGeom prst="rect">
             <a:avLst/>
@@ -19710,14 +20076,13 @@
         </p:nvPicPr>
         <p:blipFill>
           <a:blip r:embed="rId3"/>
-          <a:stretch>
-            <a:fillRect/>
-          </a:stretch>
+          <a:srcRect t="7009" b="20401"/>
+          <a:stretch/>
         </p:blipFill>
         <p:spPr>
           <a:xfrm>
-            <a:off x="1968720" y="2356950"/>
-            <a:ext cx="7839471" cy="3998130"/>
+            <a:off x="986920" y="2514600"/>
+            <a:ext cx="10218159" cy="3782834"/>
           </a:xfrm>
           <a:prstGeom prst="rect">
             <a:avLst/>
@@ -19761,15 +20126,7 @@
             </a:br>
             <a:r>
               <a:rPr lang="en-US" sz="3000" dirty="0"/>
-              <a:t> Zero-Shot transfer for </a:t>
-            </a:r>
-            <a:r>
-              <a:rPr lang="en-US" sz="3000" dirty="0" err="1"/>
-              <a:t>MultiModal</a:t>
-            </a:r>
-            <a:r>
-              <a:rPr lang="en-US" sz="3000" dirty="0"/>
-              <a:t> Models (CLIP)</a:t>
+              <a:t> Zero-Shot transfer for Multimodal Models (CLIP)</a:t>
             </a:r>
           </a:p>
         </p:txBody>
@@ -19788,8 +20145,8 @@
         </p:nvSpPr>
         <p:spPr>
           <a:xfrm>
-            <a:off x="1446362" y="6484203"/>
-            <a:ext cx="9299275" cy="830997"/>
+            <a:off x="1090906" y="6506370"/>
+            <a:ext cx="10440837" cy="830997"/>
           </a:xfrm>
           <a:prstGeom prst="rect">
             <a:avLst/>
@@ -19813,7 +20170,7 @@
                 <a:effectLst/>
                 <a:latin typeface="Arial" panose="020B0604020202020204" pitchFamily="34" charset="0"/>
               </a:rPr>
-              <a:t>A. Radford, et al. Learning transferable visual models from natural language</a:t>
+              <a:t>Figure from A. Radford, et al. Learning transferable visual models from natural language</a:t>
             </a:r>
             <a:r>
               <a:rPr lang="en-US" sz="1600" dirty="0">

</xml_diff>